<commit_message>
WIP component diagram for RPC interface overview
</commit_message>
<xml_diff>
--- a/docs/overview/SoftwareArchitecture.pptx
+++ b/docs/overview/SoftwareArchitecture.pptx
@@ -5,7 +5,7 @@
     <p:sldMasterId id="2147483660" r:id="rId1"/>
   </p:sldMasterIdLst>
   <p:notesMasterIdLst>
-    <p:notesMasterId r:id="rId8"/>
+    <p:notesMasterId r:id="rId9"/>
   </p:notesMasterIdLst>
   <p:sldIdLst>
     <p:sldId id="258" r:id="rId2"/>
@@ -14,6 +14,7 @@
     <p:sldId id="257" r:id="rId5"/>
     <p:sldId id="261" r:id="rId6"/>
     <p:sldId id="265" r:id="rId7"/>
+    <p:sldId id="266" r:id="rId8"/>
   </p:sldIdLst>
   <p:sldSz cx="12192000" cy="6858000"/>
   <p:notesSz cx="6858000" cy="9144000"/>
@@ -123,6 +124,10 @@
 </p:presentation>
 </file>
 
+<file path=ppt/revisionInfo.xml><?xml version="1.0" encoding="utf-8"?>
+<p1510:revInfo xmlns:a="http://schemas.openxmlformats.org/drawingml/2006/main" xmlns:r="http://schemas.openxmlformats.org/officeDocument/2006/relationships" xmlns:p1510="http://schemas.microsoft.com/office/powerpoint/2015/10/main"/>
+</file>
+
 <file path=ppt/notesMasters/notesMaster1.xml><?xml version="1.0" encoding="utf-8"?>
 <p:notesMaster xmlns:a="http://schemas.openxmlformats.org/drawingml/2006/main" xmlns:r="http://schemas.openxmlformats.org/officeDocument/2006/relationships" xmlns:p="http://schemas.openxmlformats.org/presentationml/2006/main">
   <p:cSld>
@@ -205,7 +210,7 @@
           <a:p>
             <a:fld id="{4E55D321-AD45-45AE-BD8C-E85B2B67AF1A}" type="datetimeFigureOut">
               <a:rPr lang="en-US" smtClean="0"/>
-              <a:t>5/16/2018</a:t>
+              <a:t>5/18/2018</a:t>
             </a:fld>
             <a:endParaRPr lang="en-US"/>
           </a:p>
@@ -1327,6 +1332,150 @@
     <p:extLst>
       <p:ext uri="{BB962C8B-B14F-4D97-AF65-F5344CB8AC3E}">
         <p14:creationId xmlns:p14="http://schemas.microsoft.com/office/powerpoint/2010/main" val="2111117055"/>
+      </p:ext>
+    </p:extLst>
+  </p:cSld>
+  <p:clrMapOvr>
+    <a:masterClrMapping/>
+  </p:clrMapOvr>
+</p:notes>
+</file>
+
+<file path=ppt/notesSlides/notesSlide7.xml><?xml version="1.0" encoding="utf-8"?>
+<p:notes xmlns:a="http://schemas.openxmlformats.org/drawingml/2006/main" xmlns:r="http://schemas.openxmlformats.org/officeDocument/2006/relationships" xmlns:p="http://schemas.openxmlformats.org/presentationml/2006/main">
+  <p:cSld>
+    <p:spTree>
+      <p:nvGrpSpPr>
+        <p:cNvPr id="1" name=""/>
+        <p:cNvGrpSpPr/>
+        <p:nvPr/>
+      </p:nvGrpSpPr>
+      <p:grpSpPr>
+        <a:xfrm>
+          <a:off x="0" y="0"/>
+          <a:ext cx="0" cy="0"/>
+          <a:chOff x="0" y="0"/>
+          <a:chExt cx="0" cy="0"/>
+        </a:xfrm>
+      </p:grpSpPr>
+      <p:sp>
+        <p:nvSpPr>
+          <p:cNvPr id="2" name="Slide Image Placeholder 1"/>
+          <p:cNvSpPr>
+            <a:spLocks noGrp="1" noRot="1" noChangeAspect="1"/>
+          </p:cNvSpPr>
+          <p:nvPr>
+            <p:ph type="sldImg"/>
+          </p:nvPr>
+        </p:nvSpPr>
+        <p:spPr/>
+      </p:sp>
+      <p:sp>
+        <p:nvSpPr>
+          <p:cNvPr id="3" name="Notes Placeholder 2"/>
+          <p:cNvSpPr>
+            <a:spLocks noGrp="1"/>
+          </p:cNvSpPr>
+          <p:nvPr>
+            <p:ph type="body" idx="1"/>
+          </p:nvPr>
+        </p:nvSpPr>
+        <p:spPr/>
+        <p:txBody>
+          <a:bodyPr/>
+          <a:lstStyle/>
+          <a:p>
+            <a:endParaRPr lang="en-US" dirty="0"/>
+          </a:p>
+        </p:txBody>
+      </p:sp>
+      <p:sp>
+        <p:nvSpPr>
+          <p:cNvPr id="4" name="Slide Number Placeholder 3"/>
+          <p:cNvSpPr>
+            <a:spLocks noGrp="1"/>
+          </p:cNvSpPr>
+          <p:nvPr>
+            <p:ph type="sldNum" sz="quarter" idx="10"/>
+          </p:nvPr>
+        </p:nvSpPr>
+        <p:spPr/>
+        <p:txBody>
+          <a:bodyPr/>
+          <a:lstStyle/>
+          <a:p>
+            <a:pPr marL="0" marR="0" lvl="0" indent="0" algn="r" defTabSz="914400" rtl="0" eaLnBrk="1" fontAlgn="auto" latinLnBrk="0" hangingPunct="1">
+              <a:lnSpc>
+                <a:spcPct val="100000"/>
+              </a:lnSpc>
+              <a:spcBef>
+                <a:spcPts val="0"/>
+              </a:spcBef>
+              <a:spcAft>
+                <a:spcPts val="0"/>
+              </a:spcAft>
+              <a:buClrTx/>
+              <a:buSzTx/>
+              <a:buFontTx/>
+              <a:buNone/>
+              <a:tabLst/>
+              <a:defRPr/>
+            </a:pPr>
+            <a:fld id="{5A759874-2F11-4582-8757-D26ED139F31A}" type="slidenum">
+              <a:rPr kumimoji="0" lang="en-US" sz="1200" b="0" i="0" u="none" strike="noStrike" kern="1200" cap="none" spc="0" normalizeH="0" baseline="0" noProof="0" smtClean="0">
+                <a:ln>
+                  <a:noFill/>
+                </a:ln>
+                <a:solidFill>
+                  <a:prstClr val="black"/>
+                </a:solidFill>
+                <a:effectLst/>
+                <a:uLnTx/>
+                <a:uFillTx/>
+                <a:latin typeface="Calibri" panose="020F0502020204030204"/>
+                <a:ea typeface="+mn-ea"/>
+                <a:cs typeface="+mn-cs"/>
+              </a:rPr>
+              <a:pPr marL="0" marR="0" lvl="0" indent="0" algn="r" defTabSz="914400" rtl="0" eaLnBrk="1" fontAlgn="auto" latinLnBrk="0" hangingPunct="1">
+                <a:lnSpc>
+                  <a:spcPct val="100000"/>
+                </a:lnSpc>
+                <a:spcBef>
+                  <a:spcPts val="0"/>
+                </a:spcBef>
+                <a:spcAft>
+                  <a:spcPts val="0"/>
+                </a:spcAft>
+                <a:buClrTx/>
+                <a:buSzTx/>
+                <a:buFontTx/>
+                <a:buNone/>
+                <a:tabLst/>
+                <a:defRPr/>
+              </a:pPr>
+              <a:t>7</a:t>
+            </a:fld>
+            <a:endParaRPr kumimoji="0" lang="en-US" sz="1200" b="0" i="0" u="none" strike="noStrike" kern="1200" cap="none" spc="0" normalizeH="0" baseline="0" noProof="0">
+              <a:ln>
+                <a:noFill/>
+              </a:ln>
+              <a:solidFill>
+                <a:prstClr val="black"/>
+              </a:solidFill>
+              <a:effectLst/>
+              <a:uLnTx/>
+              <a:uFillTx/>
+              <a:latin typeface="Calibri" panose="020F0502020204030204"/>
+              <a:ea typeface="+mn-ea"/>
+              <a:cs typeface="+mn-cs"/>
+            </a:endParaRPr>
+          </a:p>
+        </p:txBody>
+      </p:sp>
+    </p:spTree>
+    <p:extLst>
+      <p:ext uri="{BB962C8B-B14F-4D97-AF65-F5344CB8AC3E}">
+        <p14:creationId xmlns:p14="http://schemas.microsoft.com/office/powerpoint/2010/main" val="2467718115"/>
       </p:ext>
     </p:extLst>
   </p:cSld>
@@ -25677,8 +25826,8 @@
         </p:nvSpPr>
         <p:spPr>
           <a:xfrm>
-            <a:off x="4014788" y="981275"/>
-            <a:ext cx="4162425" cy="1476695"/>
+            <a:off x="7158450" y="2800012"/>
+            <a:ext cx="3147600" cy="1476695"/>
           </a:xfrm>
           <a:prstGeom prst="rect">
             <a:avLst/>
@@ -25709,7 +25858,7 @@
                 </a:solidFill>
                 <a:latin typeface="Calibri" panose="020F0502020204030204"/>
               </a:rPr>
-              <a:t>Server Context</a:t>
+              <a:t>Server</a:t>
             </a:r>
           </a:p>
         </p:txBody>
@@ -25728,8 +25877,8 @@
         </p:nvSpPr>
         <p:spPr>
           <a:xfrm>
-            <a:off x="4014788" y="4400029"/>
-            <a:ext cx="4162425" cy="1476696"/>
+            <a:off x="825690" y="2813043"/>
+            <a:ext cx="2984272" cy="1476696"/>
           </a:xfrm>
           <a:prstGeom prst="rect">
             <a:avLst/>
@@ -25763,316 +25912,529 @@
                 </a:solidFill>
                 <a:latin typeface="Calibri" panose="020F0502020204030204"/>
               </a:rPr>
-              <a:t>Client Context</a:t>
+              <a:t>Client</a:t>
             </a:r>
           </a:p>
         </p:txBody>
       </p:sp>
-      <p:grpSp>
-        <p:nvGrpSpPr>
-          <p:cNvPr id="62" name="Group 61">
+      <p:cxnSp>
+        <p:nvCxnSpPr>
+          <p:cNvPr id="5" name="Straight Connector 4">
             <a:extLst>
               <a:ext uri="{FF2B5EF4-FFF2-40B4-BE49-F238E27FC236}">
-                <a16:creationId xmlns:a16="http://schemas.microsoft.com/office/drawing/2014/main" id="{EDE77A71-224D-44D5-A9A5-E996C41BE920}"/>
+                <a16:creationId xmlns:a16="http://schemas.microsoft.com/office/drawing/2014/main" id="{23E10C64-9FEB-48D6-8A85-024A4C37BFCB}"/>
               </a:ext>
             </a:extLst>
           </p:cNvPr>
-          <p:cNvGrpSpPr/>
+          <p:cNvCxnSpPr>
+            <a:cxnSpLocks/>
+            <a:endCxn id="35" idx="6"/>
+          </p:cNvCxnSpPr>
           <p:nvPr/>
-        </p:nvGrpSpPr>
-        <p:grpSpPr>
+        </p:nvCxnSpPr>
+        <p:spPr>
+          <a:xfrm flipH="1">
+            <a:off x="6472969" y="3570789"/>
+            <a:ext cx="214812" cy="6156"/>
+          </a:xfrm>
+          <a:prstGeom prst="line">
+            <a:avLst/>
+          </a:prstGeom>
+          <a:ln w="12700">
+            <a:solidFill>
+              <a:schemeClr val="tx1"/>
+            </a:solidFill>
+          </a:ln>
+        </p:spPr>
+        <p:style>
+          <a:lnRef idx="1">
+            <a:schemeClr val="accent1"/>
+          </a:lnRef>
+          <a:fillRef idx="0">
+            <a:schemeClr val="accent1"/>
+          </a:fillRef>
+          <a:effectRef idx="0">
+            <a:schemeClr val="accent1"/>
+          </a:effectRef>
+          <a:fontRef idx="minor">
+            <a:schemeClr val="tx1"/>
+          </a:fontRef>
+        </p:style>
+      </p:cxnSp>
+      <p:sp>
+        <p:nvSpPr>
+          <p:cNvPr id="27" name="TextBox 26">
+            <a:extLst>
+              <a:ext uri="{FF2B5EF4-FFF2-40B4-BE49-F238E27FC236}">
+                <a16:creationId xmlns:a16="http://schemas.microsoft.com/office/drawing/2014/main" id="{EFCD44AA-0FA2-4A03-937E-25C9E40D46BD}"/>
+              </a:ext>
+            </a:extLst>
+          </p:cNvPr>
+          <p:cNvSpPr txBox="1"/>
+          <p:nvPr/>
+        </p:nvSpPr>
+        <p:spPr>
           <a:xfrm>
-            <a:off x="4273404" y="4919970"/>
-            <a:ext cx="1728915" cy="741869"/>
-            <a:chOff x="4273403" y="5605250"/>
-            <a:chExt cx="1728915" cy="741869"/>
+            <a:off x="4428692" y="896943"/>
+            <a:ext cx="2142705" cy="369332"/>
           </a:xfrm>
-        </p:grpSpPr>
-        <p:sp>
-          <p:nvSpPr>
-            <p:cNvPr id="65" name="Rectangle 64">
-              <a:extLst>
-                <a:ext uri="{FF2B5EF4-FFF2-40B4-BE49-F238E27FC236}">
-                  <a16:creationId xmlns:a16="http://schemas.microsoft.com/office/drawing/2014/main" id="{A8C81335-56AB-4C23-B0D1-C245F8BCE21D}"/>
-                </a:ext>
-              </a:extLst>
-            </p:cNvPr>
-            <p:cNvSpPr/>
-            <p:nvPr/>
-          </p:nvSpPr>
-          <p:spPr>
-            <a:xfrm>
-              <a:off x="4273403" y="5605250"/>
-              <a:ext cx="1728915" cy="741869"/>
-            </a:xfrm>
-            <a:prstGeom prst="rect">
-              <a:avLst/>
-            </a:prstGeom>
-            <a:solidFill>
-              <a:schemeClr val="bg1">
-                <a:lumMod val="85000"/>
-              </a:schemeClr>
-            </a:solidFill>
-            <a:ln>
+          <a:prstGeom prst="rect">
+            <a:avLst/>
+          </a:prstGeom>
+          <a:solidFill>
+            <a:srgbClr val="FFFF00"/>
+          </a:solidFill>
+        </p:spPr>
+        <p:txBody>
+          <a:bodyPr wrap="square" rtlCol="0">
+            <a:spAutoFit/>
+          </a:bodyPr>
+          <a:lstStyle/>
+          <a:p>
+            <a:r>
+              <a:rPr lang="en-US" dirty="0"/>
+              <a:t>I/F = RPC interface</a:t>
+            </a:r>
+          </a:p>
+        </p:txBody>
+      </p:sp>
+      <p:sp>
+        <p:nvSpPr>
+          <p:cNvPr id="10" name="Rectangle 9">
+            <a:extLst>
+              <a:ext uri="{FF2B5EF4-FFF2-40B4-BE49-F238E27FC236}">
+                <a16:creationId xmlns:a16="http://schemas.microsoft.com/office/drawing/2014/main" id="{BEFC421F-E0C9-43A4-96E7-3A41DEA650DE}"/>
+              </a:ext>
+            </a:extLst>
+          </p:cNvPr>
+          <p:cNvSpPr/>
+          <p:nvPr/>
+        </p:nvSpPr>
+        <p:spPr>
+          <a:xfrm>
+            <a:off x="9359949" y="3266327"/>
+            <a:ext cx="806837" cy="518003"/>
+          </a:xfrm>
+          <a:prstGeom prst="rect">
+            <a:avLst/>
+          </a:prstGeom>
+          <a:solidFill>
+            <a:srgbClr val="FFFF00"/>
+          </a:solidFill>
+        </p:spPr>
+        <p:style>
+          <a:lnRef idx="2">
+            <a:schemeClr val="accent1">
+              <a:shade val="50000"/>
+            </a:schemeClr>
+          </a:lnRef>
+          <a:fillRef idx="1">
+            <a:schemeClr val="accent1"/>
+          </a:fillRef>
+          <a:effectRef idx="0">
+            <a:schemeClr val="accent1"/>
+          </a:effectRef>
+          <a:fontRef idx="minor">
+            <a:schemeClr val="lt1"/>
+          </a:fontRef>
+        </p:style>
+        <p:txBody>
+          <a:bodyPr rtlCol="0" anchor="ctr"/>
+          <a:lstStyle/>
+          <a:p>
+            <a:pPr algn="ctr"/>
+            <a:r>
+              <a:rPr lang="en-US" dirty="0">
+                <a:solidFill>
+                  <a:schemeClr val="tx1"/>
+                </a:solidFill>
+              </a:rPr>
+              <a:t>{</a:t>
+            </a:r>
+            <a:r>
+              <a:rPr lang="en-US" dirty="0" err="1">
+                <a:solidFill>
+                  <a:schemeClr val="tx1"/>
+                </a:solidFill>
+              </a:rPr>
+              <a:t>impl</a:t>
+            </a:r>
+            <a:r>
+              <a:rPr lang="en-US" dirty="0">
+                <a:solidFill>
+                  <a:schemeClr val="tx1"/>
+                </a:solidFill>
+              </a:rPr>
+              <a:t>}</a:t>
+            </a:r>
+          </a:p>
+        </p:txBody>
+      </p:sp>
+      <p:sp>
+        <p:nvSpPr>
+          <p:cNvPr id="11" name="Rectangle 10">
+            <a:extLst>
+              <a:ext uri="{FF2B5EF4-FFF2-40B4-BE49-F238E27FC236}">
+                <a16:creationId xmlns:a16="http://schemas.microsoft.com/office/drawing/2014/main" id="{C1C12F37-E519-48CA-AC52-D2ADB5E3D89C}"/>
+              </a:ext>
+            </a:extLst>
+          </p:cNvPr>
+          <p:cNvSpPr/>
+          <p:nvPr/>
+        </p:nvSpPr>
+        <p:spPr>
+          <a:xfrm>
+            <a:off x="7986104" y="3279357"/>
+            <a:ext cx="1373845" cy="518003"/>
+          </a:xfrm>
+          <a:prstGeom prst="rect">
+            <a:avLst/>
+          </a:prstGeom>
+          <a:solidFill>
+            <a:srgbClr val="FFC000"/>
+          </a:solidFill>
+        </p:spPr>
+        <p:style>
+          <a:lnRef idx="2">
+            <a:schemeClr val="accent1">
+              <a:shade val="50000"/>
+            </a:schemeClr>
+          </a:lnRef>
+          <a:fillRef idx="1">
+            <a:schemeClr val="accent1"/>
+          </a:fillRef>
+          <a:effectRef idx="0">
+            <a:schemeClr val="accent1"/>
+          </a:effectRef>
+          <a:fontRef idx="minor">
+            <a:schemeClr val="lt1"/>
+          </a:fontRef>
+        </p:style>
+        <p:txBody>
+          <a:bodyPr rtlCol="0" anchor="ctr"/>
+          <a:lstStyle/>
+          <a:p>
+            <a:pPr algn="ctr"/>
+            <a:r>
+              <a:rPr lang="en-US" dirty="0" err="1">
+                <a:solidFill>
+                  <a:schemeClr val="tx1"/>
+                </a:solidFill>
+              </a:rPr>
+              <a:t>RpcManger</a:t>
+            </a:r>
+            <a:endParaRPr lang="en-US" dirty="0">
               <a:solidFill>
                 <a:schemeClr val="tx1"/>
               </a:solidFill>
-            </a:ln>
-          </p:spPr>
-          <p:txBody>
-            <a:bodyPr rot="0" spcFirstLastPara="0" vertOverflow="overflow" horzOverflow="overflow" vert="horz" wrap="square" lIns="91440" tIns="45720" rIns="91440" bIns="45720" numCol="1" spcCol="0" rtlCol="0" fromWordArt="0" anchor="t" anchorCtr="0" forceAA="0" compatLnSpc="1">
-              <a:prstTxWarp prst="textNoShape">
-                <a:avLst/>
-              </a:prstTxWarp>
-              <a:noAutofit/>
-            </a:bodyPr>
-            <a:lstStyle/>
-            <a:p>
-              <a:pPr marL="0" marR="0" lvl="0" indent="0" algn="ctr" defTabSz="914400" rtl="0" eaLnBrk="1" fontAlgn="auto" latinLnBrk="0" hangingPunct="1">
-                <a:lnSpc>
-                  <a:spcPct val="100000"/>
-                </a:lnSpc>
-                <a:spcBef>
-                  <a:spcPts val="0"/>
-                </a:spcBef>
-                <a:spcAft>
-                  <a:spcPts val="0"/>
-                </a:spcAft>
-                <a:buClrTx/>
-                <a:buSzTx/>
-                <a:buFontTx/>
-                <a:buNone/>
-                <a:tabLst/>
-                <a:defRPr/>
-              </a:pPr>
-              <a:r>
-                <a:rPr kumimoji="0" lang="en-US" sz="1400" b="0" i="0" u="none" strike="noStrike" kern="0" cap="none" spc="0" normalizeH="0" baseline="0" noProof="0" dirty="0">
-                  <a:ln>
-                    <a:noFill/>
-                  </a:ln>
-                  <a:solidFill>
-                    <a:prstClr val="black"/>
-                  </a:solidFill>
-                  <a:effectLst/>
-                  <a:uLnTx/>
-                  <a:uFillTx/>
-                  <a:latin typeface="Calibri" panose="020F0502020204030204"/>
-                  <a:ea typeface="+mn-ea"/>
-                  <a:cs typeface="+mn-cs"/>
-                </a:rPr>
-                <a:t>RPC Client Stub</a:t>
-              </a:r>
-            </a:p>
-          </p:txBody>
-        </p:sp>
-        <p:sp>
-          <p:nvSpPr>
-            <p:cNvPr id="95" name="Rectangle 94">
-              <a:extLst>
-                <a:ext uri="{FF2B5EF4-FFF2-40B4-BE49-F238E27FC236}">
-                  <a16:creationId xmlns:a16="http://schemas.microsoft.com/office/drawing/2014/main" id="{255B5014-45F0-444C-98A5-4B1638ED0BC0}"/>
-                </a:ext>
-              </a:extLst>
-            </p:cNvPr>
-            <p:cNvSpPr/>
-            <p:nvPr/>
-          </p:nvSpPr>
-          <p:spPr>
-            <a:xfrm>
-              <a:off x="4523497" y="5912532"/>
-              <a:ext cx="1228726" cy="324296"/>
-            </a:xfrm>
-            <a:prstGeom prst="rect">
-              <a:avLst/>
-            </a:prstGeom>
-            <a:solidFill>
-              <a:srgbClr val="FFFF99"/>
-            </a:solidFill>
-            <a:ln>
-              <a:solidFill>
-                <a:sysClr val="windowText" lastClr="000000"/>
-              </a:solidFill>
-            </a:ln>
-          </p:spPr>
-          <p:txBody>
-            <a:bodyPr rot="0" spcFirstLastPara="0" vertOverflow="overflow" horzOverflow="overflow" vert="horz" wrap="square" lIns="91440" tIns="45720" rIns="91440" bIns="45720" numCol="1" spcCol="0" rtlCol="0" fromWordArt="0" anchor="t" anchorCtr="0" forceAA="0" compatLnSpc="1">
-              <a:prstTxWarp prst="textNoShape">
-                <a:avLst/>
-              </a:prstTxWarp>
-              <a:noAutofit/>
-            </a:bodyPr>
-            <a:lstStyle/>
-            <a:p>
-              <a:pPr algn="ctr"/>
-              <a:r>
-                <a:rPr lang="en-US" sz="1400" kern="0" dirty="0">
-                  <a:solidFill>
-                    <a:prstClr val="black"/>
-                  </a:solidFill>
-                  <a:latin typeface="Calibri" panose="020F0502020204030204"/>
-                </a:rPr>
-                <a:t>RPC Interface </a:t>
-              </a:r>
-            </a:p>
-          </p:txBody>
-        </p:sp>
-      </p:grpSp>
-      <p:grpSp>
-        <p:nvGrpSpPr>
-          <p:cNvPr id="59" name="Group 58">
+            </a:endParaRPr>
+          </a:p>
+        </p:txBody>
+      </p:sp>
+      <p:sp>
+        <p:nvSpPr>
+          <p:cNvPr id="34" name="Rectangle 33">
             <a:extLst>
               <a:ext uri="{FF2B5EF4-FFF2-40B4-BE49-F238E27FC236}">
-                <a16:creationId xmlns:a16="http://schemas.microsoft.com/office/drawing/2014/main" id="{97256E76-BC60-46E3-ADFD-AE4A78FFD409}"/>
+                <a16:creationId xmlns:a16="http://schemas.microsoft.com/office/drawing/2014/main" id="{025883A8-2555-4883-A33C-E4C7046D86A2}"/>
               </a:ext>
             </a:extLst>
           </p:cNvPr>
-          <p:cNvGrpSpPr/>
+          <p:cNvSpPr/>
           <p:nvPr/>
-        </p:nvGrpSpPr>
-        <p:grpSpPr>
+        </p:nvSpPr>
+        <p:spPr>
           <a:xfrm>
-            <a:off x="4273404" y="1457598"/>
-            <a:ext cx="1728915" cy="741869"/>
-            <a:chOff x="4275097" y="2142878"/>
-            <a:chExt cx="1728915" cy="741869"/>
+            <a:off x="1557773" y="3302625"/>
+            <a:ext cx="1402926" cy="518003"/>
           </a:xfrm>
-        </p:grpSpPr>
-        <p:sp>
-          <p:nvSpPr>
-            <p:cNvPr id="96" name="Rectangle 95">
-              <a:extLst>
-                <a:ext uri="{FF2B5EF4-FFF2-40B4-BE49-F238E27FC236}">
-                  <a16:creationId xmlns:a16="http://schemas.microsoft.com/office/drawing/2014/main" id="{CED35DA1-8B29-4575-933D-2D170A2B1934}"/>
-                </a:ext>
-              </a:extLst>
-            </p:cNvPr>
-            <p:cNvSpPr/>
-            <p:nvPr/>
-          </p:nvSpPr>
-          <p:spPr>
-            <a:xfrm>
-              <a:off x="4275097" y="2142878"/>
-              <a:ext cx="1728915" cy="741869"/>
-            </a:xfrm>
-            <a:prstGeom prst="rect">
-              <a:avLst/>
-            </a:prstGeom>
-            <a:solidFill>
-              <a:schemeClr val="accent1">
-                <a:lumMod val="20000"/>
-                <a:lumOff val="80000"/>
-              </a:schemeClr>
-            </a:solidFill>
-            <a:ln>
+          <a:prstGeom prst="rect">
+            <a:avLst/>
+          </a:prstGeom>
+          <a:solidFill>
+            <a:srgbClr val="FFC000"/>
+          </a:solidFill>
+        </p:spPr>
+        <p:style>
+          <a:lnRef idx="2">
+            <a:schemeClr val="accent1">
+              <a:shade val="50000"/>
+            </a:schemeClr>
+          </a:lnRef>
+          <a:fillRef idx="1">
+            <a:schemeClr val="accent1"/>
+          </a:fillRef>
+          <a:effectRef idx="0">
+            <a:schemeClr val="accent1"/>
+          </a:effectRef>
+          <a:fontRef idx="minor">
+            <a:schemeClr val="lt1"/>
+          </a:fontRef>
+        </p:style>
+        <p:txBody>
+          <a:bodyPr rtlCol="0" anchor="ctr"/>
+          <a:lstStyle/>
+          <a:p>
+            <a:pPr algn="ctr"/>
+            <a:r>
+              <a:rPr lang="en-US" dirty="0" err="1">
+                <a:solidFill>
+                  <a:schemeClr val="tx1"/>
+                </a:solidFill>
+              </a:rPr>
+              <a:t>RpcManger</a:t>
+            </a:r>
+            <a:endParaRPr lang="en-US" dirty="0">
               <a:solidFill>
                 <a:schemeClr val="tx1"/>
               </a:solidFill>
-            </a:ln>
-          </p:spPr>
-          <p:txBody>
-            <a:bodyPr rot="0" spcFirstLastPara="0" vertOverflow="overflow" horzOverflow="overflow" vert="horz" wrap="square" lIns="91440" tIns="45720" rIns="91440" bIns="45720" numCol="1" spcCol="0" rtlCol="0" fromWordArt="0" anchor="t" anchorCtr="0" forceAA="0" compatLnSpc="1">
-              <a:prstTxWarp prst="textNoShape">
-                <a:avLst/>
-              </a:prstTxWarp>
-              <a:noAutofit/>
-            </a:bodyPr>
-            <a:lstStyle/>
-            <a:p>
-              <a:pPr marL="0" marR="0" lvl="0" indent="0" algn="ctr" defTabSz="914400" rtl="0" eaLnBrk="1" fontAlgn="auto" latinLnBrk="0" hangingPunct="1">
-                <a:lnSpc>
-                  <a:spcPct val="100000"/>
-                </a:lnSpc>
-                <a:spcBef>
-                  <a:spcPts val="0"/>
-                </a:spcBef>
-                <a:spcAft>
-                  <a:spcPts val="0"/>
-                </a:spcAft>
-                <a:buClrTx/>
-                <a:buSzTx/>
-                <a:buFontTx/>
-                <a:buNone/>
-                <a:tabLst/>
-                <a:defRPr/>
-              </a:pPr>
-              <a:r>
-                <a:rPr kumimoji="0" lang="en-US" sz="1400" b="0" i="0" u="none" strike="noStrike" kern="0" cap="none" spc="0" normalizeH="0" baseline="0" noProof="0" dirty="0">
-                  <a:ln>
-                    <a:noFill/>
-                  </a:ln>
-                  <a:solidFill>
-                    <a:prstClr val="black"/>
-                  </a:solidFill>
-                  <a:effectLst/>
-                  <a:uLnTx/>
-                  <a:uFillTx/>
-                  <a:latin typeface="Calibri" panose="020F0502020204030204"/>
-                  <a:ea typeface="+mn-ea"/>
-                  <a:cs typeface="+mn-cs"/>
-                </a:rPr>
-                <a:t>RPC Implementation</a:t>
-              </a:r>
-            </a:p>
-          </p:txBody>
-        </p:sp>
-        <p:sp>
-          <p:nvSpPr>
-            <p:cNvPr id="97" name="Rectangle 96">
-              <a:extLst>
-                <a:ext uri="{FF2B5EF4-FFF2-40B4-BE49-F238E27FC236}">
-                  <a16:creationId xmlns:a16="http://schemas.microsoft.com/office/drawing/2014/main" id="{67F7D8D2-2828-4AA0-8CA9-6691966C07D5}"/>
-                </a:ext>
-              </a:extLst>
-            </p:cNvPr>
-            <p:cNvSpPr/>
-            <p:nvPr/>
-          </p:nvSpPr>
-          <p:spPr>
-            <a:xfrm>
-              <a:off x="4525191" y="2450160"/>
-              <a:ext cx="1228726" cy="324296"/>
-            </a:xfrm>
-            <a:prstGeom prst="rect">
-              <a:avLst/>
-            </a:prstGeom>
-            <a:solidFill>
-              <a:srgbClr val="FFFF99"/>
-            </a:solidFill>
-            <a:ln>
-              <a:solidFill>
-                <a:sysClr val="windowText" lastClr="000000"/>
-              </a:solidFill>
-            </a:ln>
-          </p:spPr>
-          <p:txBody>
-            <a:bodyPr rot="0" spcFirstLastPara="0" vertOverflow="overflow" horzOverflow="overflow" vert="horz" wrap="square" lIns="91440" tIns="45720" rIns="91440" bIns="45720" numCol="1" spcCol="0" rtlCol="0" fromWordArt="0" anchor="t" anchorCtr="0" forceAA="0" compatLnSpc="1">
-              <a:prstTxWarp prst="textNoShape">
-                <a:avLst/>
-              </a:prstTxWarp>
-              <a:noAutofit/>
-            </a:bodyPr>
-            <a:lstStyle/>
-            <a:p>
-              <a:pPr algn="ctr"/>
-              <a:r>
-                <a:rPr lang="en-US" sz="1400" kern="0" dirty="0">
-                  <a:solidFill>
-                    <a:prstClr val="black"/>
-                  </a:solidFill>
-                  <a:latin typeface="Calibri" panose="020F0502020204030204"/>
-                </a:rPr>
-                <a:t>RPC Interface </a:t>
-              </a:r>
-            </a:p>
-          </p:txBody>
-        </p:sp>
-      </p:grpSp>
+            </a:endParaRPr>
+          </a:p>
+        </p:txBody>
+      </p:sp>
       <p:sp>
         <p:nvSpPr>
-          <p:cNvPr id="99" name="Arrow: Down 98">
+          <p:cNvPr id="37" name="Rectangle 36">
             <a:extLst>
               <a:ext uri="{FF2B5EF4-FFF2-40B4-BE49-F238E27FC236}">
-                <a16:creationId xmlns:a16="http://schemas.microsoft.com/office/drawing/2014/main" id="{367D0F72-8721-4AA1-A65D-8653EE668C8F}"/>
+                <a16:creationId xmlns:a16="http://schemas.microsoft.com/office/drawing/2014/main" id="{42F01C13-7B00-4975-B909-7B5CE748506C}"/>
+              </a:ext>
+            </a:extLst>
+          </p:cNvPr>
+          <p:cNvSpPr/>
+          <p:nvPr/>
+        </p:nvSpPr>
+        <p:spPr>
+          <a:xfrm>
+            <a:off x="7478469" y="3288975"/>
+            <a:ext cx="492528" cy="518003"/>
+          </a:xfrm>
+          <a:prstGeom prst="rect">
+            <a:avLst/>
+          </a:prstGeom>
+          <a:solidFill>
+            <a:srgbClr val="FFFF00"/>
+          </a:solidFill>
+        </p:spPr>
+        <p:style>
+          <a:lnRef idx="2">
+            <a:schemeClr val="accent1">
+              <a:shade val="50000"/>
+            </a:schemeClr>
+          </a:lnRef>
+          <a:fillRef idx="1">
+            <a:schemeClr val="accent1"/>
+          </a:fillRef>
+          <a:effectRef idx="0">
+            <a:schemeClr val="accent1"/>
+          </a:effectRef>
+          <a:fontRef idx="minor">
+            <a:schemeClr val="lt1"/>
+          </a:fontRef>
+        </p:style>
+        <p:txBody>
+          <a:bodyPr rtlCol="0" anchor="ctr"/>
+          <a:lstStyle/>
+          <a:p>
+            <a:pPr algn="ctr"/>
+            <a:r>
+              <a:rPr lang="en-US" dirty="0">
+                <a:solidFill>
+                  <a:schemeClr val="tx1"/>
+                </a:solidFill>
+              </a:rPr>
+              <a:t>I/F</a:t>
+            </a:r>
+          </a:p>
+        </p:txBody>
+      </p:sp>
+      <p:sp>
+        <p:nvSpPr>
+          <p:cNvPr id="38" name="Rectangle 37">
+            <a:extLst>
+              <a:ext uri="{FF2B5EF4-FFF2-40B4-BE49-F238E27FC236}">
+                <a16:creationId xmlns:a16="http://schemas.microsoft.com/office/drawing/2014/main" id="{3B367103-D234-4DA4-9226-829A3EAD1607}"/>
+              </a:ext>
+            </a:extLst>
+          </p:cNvPr>
+          <p:cNvSpPr/>
+          <p:nvPr/>
+        </p:nvSpPr>
+        <p:spPr>
+          <a:xfrm>
+            <a:off x="2982306" y="3305467"/>
+            <a:ext cx="492528" cy="518003"/>
+          </a:xfrm>
+          <a:prstGeom prst="rect">
+            <a:avLst/>
+          </a:prstGeom>
+          <a:solidFill>
+            <a:srgbClr val="FFFF00"/>
+          </a:solidFill>
+        </p:spPr>
+        <p:style>
+          <a:lnRef idx="2">
+            <a:schemeClr val="accent1">
+              <a:shade val="50000"/>
+            </a:schemeClr>
+          </a:lnRef>
+          <a:fillRef idx="1">
+            <a:schemeClr val="accent1"/>
+          </a:fillRef>
+          <a:effectRef idx="0">
+            <a:schemeClr val="accent1"/>
+          </a:effectRef>
+          <a:fontRef idx="minor">
+            <a:schemeClr val="lt1"/>
+          </a:fontRef>
+        </p:style>
+        <p:txBody>
+          <a:bodyPr rtlCol="0" anchor="ctr"/>
+          <a:lstStyle/>
+          <a:p>
+            <a:pPr algn="ctr"/>
+            <a:r>
+              <a:rPr lang="en-US" dirty="0">
+                <a:solidFill>
+                  <a:schemeClr val="tx1"/>
+                </a:solidFill>
+              </a:rPr>
+              <a:t>I/F</a:t>
+            </a:r>
+          </a:p>
+        </p:txBody>
+      </p:sp>
+      <p:sp>
+        <p:nvSpPr>
+          <p:cNvPr id="14" name="TextBox 13">
+            <a:extLst>
+              <a:ext uri="{FF2B5EF4-FFF2-40B4-BE49-F238E27FC236}">
+                <a16:creationId xmlns:a16="http://schemas.microsoft.com/office/drawing/2014/main" id="{512D62FC-0CFF-48ED-A553-CDD39D1D4C37}"/>
+              </a:ext>
+            </a:extLst>
+          </p:cNvPr>
+          <p:cNvSpPr txBox="1"/>
+          <p:nvPr/>
+        </p:nvSpPr>
+        <p:spPr>
+          <a:xfrm>
+            <a:off x="872292" y="3363311"/>
+            <a:ext cx="682975" cy="369332"/>
+          </a:xfrm>
+          <a:prstGeom prst="rect">
+            <a:avLst/>
+          </a:prstGeom>
+          <a:solidFill>
+            <a:srgbClr val="FFFF00"/>
+          </a:solidFill>
+          <a:ln>
+            <a:solidFill>
+              <a:schemeClr val="tx1"/>
+            </a:solidFill>
+          </a:ln>
+        </p:spPr>
+        <p:txBody>
+          <a:bodyPr wrap="square" rtlCol="0">
+            <a:spAutoFit/>
+          </a:bodyPr>
+          <a:lstStyle/>
+          <a:p>
+            <a:r>
+              <a:rPr lang="en-US" dirty="0"/>
+              <a:t>{call}</a:t>
+            </a:r>
+          </a:p>
+        </p:txBody>
+      </p:sp>
+      <p:sp>
+        <p:nvSpPr>
+          <p:cNvPr id="15" name="TextBox 14">
+            <a:extLst>
+              <a:ext uri="{FF2B5EF4-FFF2-40B4-BE49-F238E27FC236}">
+                <a16:creationId xmlns:a16="http://schemas.microsoft.com/office/drawing/2014/main" id="{B8DC5225-7729-4418-AADE-03C4CB9EA8FD}"/>
+              </a:ext>
+            </a:extLst>
+          </p:cNvPr>
+          <p:cNvSpPr txBox="1"/>
+          <p:nvPr/>
+        </p:nvSpPr>
+        <p:spPr>
+          <a:xfrm>
+            <a:off x="4743721" y="3912134"/>
+            <a:ext cx="1425110" cy="646331"/>
+          </a:xfrm>
+          <a:prstGeom prst="rect">
+            <a:avLst/>
+          </a:prstGeom>
+          <a:noFill/>
+        </p:spPr>
+        <p:txBody>
+          <a:bodyPr wrap="square" rtlCol="0">
+            <a:spAutoFit/>
+          </a:bodyPr>
+          <a:lstStyle/>
+          <a:p>
+            <a:pPr algn="ctr"/>
+            <a:r>
+              <a:rPr lang="en-US" dirty="0"/>
+              <a:t>Configured Transport</a:t>
+            </a:r>
+          </a:p>
+        </p:txBody>
+      </p:sp>
+      <p:cxnSp>
+        <p:nvCxnSpPr>
+          <p:cNvPr id="17" name="Straight Connector 16">
+            <a:extLst>
+              <a:ext uri="{FF2B5EF4-FFF2-40B4-BE49-F238E27FC236}">
+                <a16:creationId xmlns:a16="http://schemas.microsoft.com/office/drawing/2014/main" id="{0CB25B62-3E9D-433B-A66F-35917F02154A}"/>
+              </a:ext>
+            </a:extLst>
+          </p:cNvPr>
+          <p:cNvCxnSpPr>
+            <a:cxnSpLocks/>
+          </p:cNvCxnSpPr>
+          <p:nvPr/>
+        </p:nvCxnSpPr>
+        <p:spPr>
+          <a:xfrm flipH="1" flipV="1">
+            <a:off x="4720386" y="3565759"/>
+            <a:ext cx="1407210" cy="4540"/>
+          </a:xfrm>
+          <a:prstGeom prst="line">
+            <a:avLst/>
+          </a:prstGeom>
+          <a:ln w="12700">
+            <a:solidFill>
+              <a:schemeClr val="bg1">
+                <a:lumMod val="50000"/>
+              </a:schemeClr>
+            </a:solidFill>
+            <a:prstDash val="dash"/>
+            <a:headEnd type="arrow"/>
+          </a:ln>
+        </p:spPr>
+        <p:style>
+          <a:lnRef idx="1">
+            <a:schemeClr val="accent1"/>
+          </a:lnRef>
+          <a:fillRef idx="0">
+            <a:schemeClr val="accent1"/>
+          </a:fillRef>
+          <a:effectRef idx="0">
+            <a:schemeClr val="accent1"/>
+          </a:effectRef>
+          <a:fontRef idx="minor">
+            <a:schemeClr val="tx1"/>
+          </a:fontRef>
+        </p:style>
+      </p:cxnSp>
+      <p:sp>
+        <p:nvSpPr>
+          <p:cNvPr id="21" name="Arc 20">
+            <a:extLst>
+              <a:ext uri="{FF2B5EF4-FFF2-40B4-BE49-F238E27FC236}">
+                <a16:creationId xmlns:a16="http://schemas.microsoft.com/office/drawing/2014/main" id="{52FE0217-0A79-44C6-9C51-8916A088A5D9}"/>
               </a:ext>
             </a:extLst>
           </p:cNvPr>
@@ -26081,10 +26443,114 @@
         </p:nvSpPr>
         <p:spPr>
           <a:xfrm rot="10800000">
-            <a:off x="5620169" y="2519954"/>
-            <a:ext cx="951661" cy="1818091"/>
+            <a:off x="4435415" y="3400752"/>
+            <a:ext cx="345042" cy="354369"/>
           </a:xfrm>
-          <a:prstGeom prst="downArrow">
+          <a:prstGeom prst="arc">
+            <a:avLst>
+              <a:gd name="adj1" fmla="val 16200000"/>
+              <a:gd name="adj2" fmla="val 5657069"/>
+            </a:avLst>
+          </a:prstGeom>
+          <a:ln w="12700">
+            <a:solidFill>
+              <a:schemeClr val="tx1"/>
+            </a:solidFill>
+          </a:ln>
+        </p:spPr>
+        <p:style>
+          <a:lnRef idx="1">
+            <a:schemeClr val="accent1"/>
+          </a:lnRef>
+          <a:fillRef idx="0">
+            <a:schemeClr val="accent1"/>
+          </a:fillRef>
+          <a:effectRef idx="0">
+            <a:schemeClr val="accent1"/>
+          </a:effectRef>
+          <a:fontRef idx="minor">
+            <a:schemeClr val="tx1"/>
+          </a:fontRef>
+        </p:style>
+        <p:txBody>
+          <a:bodyPr rtlCol="0" anchor="ctr"/>
+          <a:lstStyle/>
+          <a:p>
+            <a:pPr algn="ctr"/>
+            <a:endParaRPr lang="en-US"/>
+          </a:p>
+        </p:txBody>
+      </p:sp>
+      <p:sp>
+        <p:nvSpPr>
+          <p:cNvPr id="35" name="Oval 34">
+            <a:extLst>
+              <a:ext uri="{FF2B5EF4-FFF2-40B4-BE49-F238E27FC236}">
+                <a16:creationId xmlns:a16="http://schemas.microsoft.com/office/drawing/2014/main" id="{F39961DD-AABC-428E-B62A-217319F3ED64}"/>
+              </a:ext>
+            </a:extLst>
+          </p:cNvPr>
+          <p:cNvSpPr/>
+          <p:nvPr/>
+        </p:nvSpPr>
+        <p:spPr>
+          <a:xfrm>
+            <a:off x="6186396" y="3436119"/>
+            <a:ext cx="286573" cy="281652"/>
+          </a:xfrm>
+          <a:prstGeom prst="ellipse">
+            <a:avLst/>
+          </a:prstGeom>
+          <a:noFill/>
+          <a:ln>
+            <a:solidFill>
+              <a:schemeClr val="tx1"/>
+            </a:solidFill>
+          </a:ln>
+        </p:spPr>
+        <p:style>
+          <a:lnRef idx="2">
+            <a:schemeClr val="accent1">
+              <a:shade val="50000"/>
+            </a:schemeClr>
+          </a:lnRef>
+          <a:fillRef idx="1">
+            <a:schemeClr val="accent1"/>
+          </a:fillRef>
+          <a:effectRef idx="0">
+            <a:schemeClr val="accent1"/>
+          </a:effectRef>
+          <a:fontRef idx="minor">
+            <a:schemeClr val="lt1"/>
+          </a:fontRef>
+        </p:style>
+        <p:txBody>
+          <a:bodyPr rtlCol="0" anchor="ctr"/>
+          <a:lstStyle/>
+          <a:p>
+            <a:pPr algn="ctr"/>
+            <a:endParaRPr lang="en-US"/>
+          </a:p>
+        </p:txBody>
+      </p:sp>
+      <p:sp>
+        <p:nvSpPr>
+          <p:cNvPr id="46" name="Rectangle: Rounded Corners 45">
+            <a:extLst>
+              <a:ext uri="{FF2B5EF4-FFF2-40B4-BE49-F238E27FC236}">
+                <a16:creationId xmlns:a16="http://schemas.microsoft.com/office/drawing/2014/main" id="{634CE7D7-EA24-45CD-9C47-AA2DFF61F15C}"/>
+              </a:ext>
+            </a:extLst>
+          </p:cNvPr>
+          <p:cNvSpPr/>
+          <p:nvPr/>
+        </p:nvSpPr>
+        <p:spPr>
+          <a:xfrm>
+            <a:off x="3522287" y="3454399"/>
+            <a:ext cx="590603" cy="232779"/>
+          </a:xfrm>
+          <a:prstGeom prst="roundRect">
             <a:avLst/>
           </a:prstGeom>
           <a:solidFill>
@@ -26092,14 +26558,209 @@
               <a:lumMod val="65000"/>
             </a:schemeClr>
           </a:solidFill>
+        </p:spPr>
+        <p:style>
+          <a:lnRef idx="2">
+            <a:schemeClr val="accent1">
+              <a:shade val="50000"/>
+            </a:schemeClr>
+          </a:lnRef>
+          <a:fillRef idx="1">
+            <a:schemeClr val="accent1"/>
+          </a:fillRef>
+          <a:effectRef idx="0">
+            <a:schemeClr val="accent1"/>
+          </a:effectRef>
+          <a:fontRef idx="minor">
+            <a:schemeClr val="lt1"/>
+          </a:fontRef>
+        </p:style>
+        <p:txBody>
+          <a:bodyPr rtlCol="0" anchor="ctr">
+            <a:normAutofit fontScale="47500" lnSpcReduction="20000"/>
+          </a:bodyPr>
+          <a:lstStyle/>
+          <a:p>
+            <a:pPr algn="ctr"/>
+            <a:r>
+              <a:rPr lang="en-US" dirty="0"/>
+              <a:t>stub</a:t>
+            </a:r>
+          </a:p>
+        </p:txBody>
+      </p:sp>
+      <p:sp>
+        <p:nvSpPr>
+          <p:cNvPr id="64" name="Rectangle: Rounded Corners 63">
+            <a:extLst>
+              <a:ext uri="{FF2B5EF4-FFF2-40B4-BE49-F238E27FC236}">
+                <a16:creationId xmlns:a16="http://schemas.microsoft.com/office/drawing/2014/main" id="{B284526C-4432-421F-A495-C9BB6F344D44}"/>
+              </a:ext>
+            </a:extLst>
+          </p:cNvPr>
+          <p:cNvSpPr/>
+          <p:nvPr/>
+        </p:nvSpPr>
+        <p:spPr>
+          <a:xfrm>
+            <a:off x="6687781" y="3454399"/>
+            <a:ext cx="769793" cy="232779"/>
+          </a:xfrm>
+          <a:prstGeom prst="roundRect">
+            <a:avLst/>
+          </a:prstGeom>
+          <a:solidFill>
+            <a:schemeClr val="bg1">
+              <a:lumMod val="65000"/>
+            </a:schemeClr>
+          </a:solidFill>
+        </p:spPr>
+        <p:style>
+          <a:lnRef idx="2">
+            <a:schemeClr val="accent1">
+              <a:shade val="50000"/>
+            </a:schemeClr>
+          </a:lnRef>
+          <a:fillRef idx="1">
+            <a:schemeClr val="accent1"/>
+          </a:fillRef>
+          <a:effectRef idx="0">
+            <a:schemeClr val="accent1"/>
+          </a:effectRef>
+          <a:fontRef idx="minor">
+            <a:schemeClr val="lt1"/>
+          </a:fontRef>
+        </p:style>
+        <p:txBody>
+          <a:bodyPr rtlCol="0" anchor="ctr">
+            <a:normAutofit fontScale="47500" lnSpcReduction="20000"/>
+          </a:bodyPr>
+          <a:lstStyle/>
+          <a:p>
+            <a:pPr algn="ctr"/>
+            <a:r>
+              <a:rPr lang="en-US" dirty="0"/>
+              <a:t>dispatch</a:t>
+            </a:r>
+          </a:p>
+        </p:txBody>
+      </p:sp>
+      <p:cxnSp>
+        <p:nvCxnSpPr>
+          <p:cNvPr id="69" name="Straight Connector 68">
+            <a:extLst>
+              <a:ext uri="{FF2B5EF4-FFF2-40B4-BE49-F238E27FC236}">
+                <a16:creationId xmlns:a16="http://schemas.microsoft.com/office/drawing/2014/main" id="{D318B453-2AAA-4695-A878-AF1BD6FFBB1D}"/>
+              </a:ext>
+            </a:extLst>
+          </p:cNvPr>
+          <p:cNvCxnSpPr>
+            <a:cxnSpLocks/>
+          </p:cNvCxnSpPr>
+          <p:nvPr/>
+        </p:nvCxnSpPr>
+        <p:spPr>
+          <a:xfrm flipH="1">
+            <a:off x="4112890" y="3570299"/>
+            <a:ext cx="320019" cy="6156"/>
+          </a:xfrm>
+          <a:prstGeom prst="line">
+            <a:avLst/>
+          </a:prstGeom>
+          <a:ln w="12700">
+            <a:solidFill>
+              <a:schemeClr val="tx1"/>
+            </a:solidFill>
+          </a:ln>
+        </p:spPr>
+        <p:style>
+          <a:lnRef idx="1">
+            <a:schemeClr val="accent1"/>
+          </a:lnRef>
+          <a:fillRef idx="0">
+            <a:schemeClr val="accent1"/>
+          </a:fillRef>
+          <a:effectRef idx="0">
+            <a:schemeClr val="accent1"/>
+          </a:effectRef>
+          <a:fontRef idx="minor">
+            <a:schemeClr val="tx1"/>
+          </a:fontRef>
+        </p:style>
+      </p:cxnSp>
+    </p:spTree>
+    <p:extLst>
+      <p:ext uri="{BB962C8B-B14F-4D97-AF65-F5344CB8AC3E}">
+        <p14:creationId xmlns:p14="http://schemas.microsoft.com/office/powerpoint/2010/main" val="3174622084"/>
+      </p:ext>
+    </p:extLst>
+  </p:cSld>
+  <p:clrMapOvr>
+    <a:masterClrMapping/>
+  </p:clrMapOvr>
+  <mc:AlternateContent xmlns:mc="http://schemas.openxmlformats.org/markup-compatibility/2006" xmlns:p14="http://schemas.microsoft.com/office/powerpoint/2010/main">
+    <mc:Choice Requires="p14">
+      <p:transition spd="med" p14:dur="700">
+        <p:fade/>
+      </p:transition>
+    </mc:Choice>
+    <mc:Fallback xmlns="">
+      <p:transition spd="med">
+        <p:fade/>
+      </p:transition>
+    </mc:Fallback>
+  </mc:AlternateContent>
+</p:sld>
+</file>
+
+<file path=ppt/slides/slide7.xml><?xml version="1.0" encoding="utf-8"?>
+<p:sld xmlns:a="http://schemas.openxmlformats.org/drawingml/2006/main" xmlns:r="http://schemas.openxmlformats.org/officeDocument/2006/relationships" xmlns:p="http://schemas.openxmlformats.org/presentationml/2006/main" showMasterSp="0">
+  <p:cSld>
+    <p:spTree>
+      <p:nvGrpSpPr>
+        <p:cNvPr id="1" name=""/>
+        <p:cNvGrpSpPr/>
+        <p:nvPr/>
+      </p:nvGrpSpPr>
+      <p:grpSpPr>
+        <a:xfrm>
+          <a:off x="0" y="0"/>
+          <a:ext cx="0" cy="0"/>
+          <a:chOff x="0" y="0"/>
+          <a:chExt cx="0" cy="0"/>
+        </a:xfrm>
+      </p:grpSpPr>
+      <p:sp>
+        <p:nvSpPr>
+          <p:cNvPr id="51" name="Rectangle 50">
+            <a:extLst>
+              <a:ext uri="{FF2B5EF4-FFF2-40B4-BE49-F238E27FC236}">
+                <a16:creationId xmlns:a16="http://schemas.microsoft.com/office/drawing/2014/main" id="{B68D098D-BF5F-475E-A2D8-9A73ACE1ACE9}"/>
+              </a:ext>
+            </a:extLst>
+          </p:cNvPr>
+          <p:cNvSpPr/>
+          <p:nvPr/>
+        </p:nvSpPr>
+        <p:spPr>
+          <a:xfrm>
+            <a:off x="7158450" y="2674962"/>
+            <a:ext cx="3147600" cy="1601746"/>
+          </a:xfrm>
+          <a:prstGeom prst="rect">
+            <a:avLst/>
+          </a:prstGeom>
+          <a:solidFill>
+            <a:srgbClr val="00B050"/>
+          </a:solidFill>
           <a:ln>
             <a:solidFill>
-              <a:sysClr val="windowText" lastClr="000000"/>
+              <a:schemeClr val="tx1"/>
             </a:solidFill>
           </a:ln>
         </p:spPr>
         <p:txBody>
-          <a:bodyPr rot="0" spcFirstLastPara="0" vertOverflow="overflow" horzOverflow="overflow" vert="vert" wrap="square" lIns="91440" tIns="45720" rIns="91440" bIns="45720" numCol="1" spcCol="0" rtlCol="0" fromWordArt="0" anchor="ctr" anchorCtr="1" forceAA="0" compatLnSpc="1">
+          <a:bodyPr rot="0" spcFirstLastPara="0" vertOverflow="overflow" horzOverflow="overflow" vert="horz" wrap="square" lIns="91440" tIns="45720" rIns="91440" bIns="45720" numCol="1" spcCol="0" rtlCol="0" fromWordArt="0" anchor="t" anchorCtr="1" forceAA="0" compatLnSpc="1">
             <a:prstTxWarp prst="textNoShape">
               <a:avLst/>
             </a:prstTxWarp>
@@ -26115,261 +26776,2104 @@
                 </a:solidFill>
                 <a:latin typeface="Calibri" panose="020F0502020204030204"/>
               </a:rPr>
-              <a:t>Transport</a:t>
+              <a:t>Server1</a:t>
             </a:r>
           </a:p>
         </p:txBody>
       </p:sp>
-      <p:grpSp>
-        <p:nvGrpSpPr>
-          <p:cNvPr id="60" name="Group 59">
+      <p:sp>
+        <p:nvSpPr>
+          <p:cNvPr id="103" name="Rectangle 102">
             <a:extLst>
               <a:ext uri="{FF2B5EF4-FFF2-40B4-BE49-F238E27FC236}">
-                <a16:creationId xmlns:a16="http://schemas.microsoft.com/office/drawing/2014/main" id="{92F2A62D-E3E8-488C-BDDB-6EAD3C811C1E}"/>
+                <a16:creationId xmlns:a16="http://schemas.microsoft.com/office/drawing/2014/main" id="{F2B61E5D-9061-4646-A831-F9BFC9522847}"/>
               </a:ext>
             </a:extLst>
           </p:cNvPr>
-          <p:cNvGrpSpPr/>
+          <p:cNvSpPr/>
           <p:nvPr/>
-        </p:nvGrpSpPr>
-        <p:grpSpPr>
+        </p:nvSpPr>
+        <p:spPr>
           <a:xfrm>
-            <a:off x="6209673" y="1457598"/>
-            <a:ext cx="1728915" cy="741869"/>
-            <a:chOff x="6209672" y="2142878"/>
-            <a:chExt cx="1728915" cy="741869"/>
+            <a:off x="825690" y="2674961"/>
+            <a:ext cx="2984272" cy="1951630"/>
           </a:xfrm>
-        </p:grpSpPr>
-        <p:sp>
-          <p:nvSpPr>
-            <p:cNvPr id="104" name="Rectangle 103">
-              <a:extLst>
-                <a:ext uri="{FF2B5EF4-FFF2-40B4-BE49-F238E27FC236}">
-                  <a16:creationId xmlns:a16="http://schemas.microsoft.com/office/drawing/2014/main" id="{FB97B4BA-AD6F-4B22-833D-EEFD34F04417}"/>
-                </a:ext>
-              </a:extLst>
-            </p:cNvPr>
-            <p:cNvSpPr/>
-            <p:nvPr/>
-          </p:nvSpPr>
-          <p:spPr>
-            <a:xfrm>
-              <a:off x="6209672" y="2142878"/>
-              <a:ext cx="1728915" cy="741869"/>
-            </a:xfrm>
-            <a:prstGeom prst="rect">
+          <a:prstGeom prst="rect">
+            <a:avLst/>
+          </a:prstGeom>
+          <a:solidFill>
+            <a:schemeClr val="accent5">
+              <a:lumMod val="60000"/>
+              <a:lumOff val="40000"/>
+            </a:schemeClr>
+          </a:solidFill>
+          <a:ln>
+            <a:solidFill>
+              <a:schemeClr val="tx1"/>
+            </a:solidFill>
+          </a:ln>
+        </p:spPr>
+        <p:txBody>
+          <a:bodyPr rot="0" spcFirstLastPara="0" vertOverflow="overflow" horzOverflow="overflow" vert="horz" wrap="square" lIns="91440" tIns="45720" rIns="91440" bIns="45720" numCol="1" spcCol="0" rtlCol="0" fromWordArt="0" anchor="t" anchorCtr="1" forceAA="0" compatLnSpc="1">
+            <a:prstTxWarp prst="textNoShape">
               <a:avLst/>
-            </a:prstGeom>
-            <a:solidFill>
-              <a:srgbClr val="FFCD2F"/>
-            </a:solidFill>
-            <a:ln>
-              <a:solidFill>
-                <a:sysClr val="windowText" lastClr="000000"/>
-              </a:solidFill>
-            </a:ln>
-          </p:spPr>
-          <p:txBody>
-            <a:bodyPr rot="0" spcFirstLastPara="0" vertOverflow="overflow" horzOverflow="overflow" vert="horz" wrap="square" lIns="91440" tIns="45720" rIns="91440" bIns="45720" numCol="1" spcCol="0" rtlCol="0" fromWordArt="0" anchor="t" anchorCtr="1" forceAA="0" compatLnSpc="1">
-              <a:prstTxWarp prst="textNoShape">
-                <a:avLst/>
-              </a:prstTxWarp>
-              <a:noAutofit/>
-            </a:bodyPr>
-            <a:lstStyle/>
-            <a:p>
-              <a:pPr algn="ctr"/>
-              <a:r>
-                <a:rPr lang="en-US" sz="1400" kern="0" dirty="0">
-                  <a:solidFill>
-                    <a:prstClr val="black"/>
-                  </a:solidFill>
-                  <a:latin typeface="Calibri" panose="020F0502020204030204"/>
-                </a:rPr>
-                <a:t>RPC Manager</a:t>
-              </a:r>
-            </a:p>
-          </p:txBody>
-        </p:sp>
-        <p:sp>
-          <p:nvSpPr>
-            <p:cNvPr id="105" name="Rectangle 104">
-              <a:extLst>
-                <a:ext uri="{FF2B5EF4-FFF2-40B4-BE49-F238E27FC236}">
-                  <a16:creationId xmlns:a16="http://schemas.microsoft.com/office/drawing/2014/main" id="{60D3534C-119B-4112-9787-7408251B5E1A}"/>
-                </a:ext>
-              </a:extLst>
-            </p:cNvPr>
-            <p:cNvSpPr/>
-            <p:nvPr/>
-          </p:nvSpPr>
-          <p:spPr>
-            <a:xfrm>
-              <a:off x="6459766" y="2450160"/>
-              <a:ext cx="1228726" cy="324296"/>
-            </a:xfrm>
-            <a:prstGeom prst="rect">
-              <a:avLst/>
-            </a:prstGeom>
-            <a:solidFill>
-              <a:srgbClr val="FFFF99"/>
-            </a:solidFill>
-            <a:ln>
-              <a:solidFill>
-                <a:sysClr val="windowText" lastClr="000000"/>
-              </a:solidFill>
-            </a:ln>
-          </p:spPr>
-          <p:txBody>
-            <a:bodyPr rot="0" spcFirstLastPara="0" vertOverflow="overflow" horzOverflow="overflow" vert="horz" wrap="square" lIns="91440" tIns="45720" rIns="91440" bIns="45720" numCol="1" spcCol="0" rtlCol="0" fromWordArt="0" anchor="t" anchorCtr="0" forceAA="0" compatLnSpc="1">
-              <a:prstTxWarp prst="textNoShape">
-                <a:avLst/>
-              </a:prstTxWarp>
-              <a:noAutofit/>
-            </a:bodyPr>
-            <a:lstStyle/>
-            <a:p>
-              <a:pPr algn="ctr"/>
-              <a:r>
-                <a:rPr lang="en-US" sz="1400" kern="0" dirty="0">
-                  <a:solidFill>
-                    <a:prstClr val="black"/>
-                  </a:solidFill>
-                  <a:latin typeface="Calibri" panose="020F0502020204030204"/>
-                </a:rPr>
-                <a:t>Configuration</a:t>
-              </a:r>
-            </a:p>
-          </p:txBody>
-        </p:sp>
-      </p:grpSp>
-      <p:grpSp>
-        <p:nvGrpSpPr>
-          <p:cNvPr id="63" name="Group 62">
+            </a:prstTxWarp>
+            <a:noAutofit/>
+          </a:bodyPr>
+          <a:lstStyle/>
+          <a:p>
+            <a:pPr algn="ctr"/>
+            <a:r>
+              <a:rPr lang="en-US" kern="0" dirty="0">
+                <a:solidFill>
+                  <a:prstClr val="black"/>
+                </a:solidFill>
+                <a:latin typeface="Calibri" panose="020F0502020204030204"/>
+              </a:rPr>
+              <a:t>Client</a:t>
+            </a:r>
+          </a:p>
+        </p:txBody>
+      </p:sp>
+      <p:cxnSp>
+        <p:nvCxnSpPr>
+          <p:cNvPr id="5" name="Straight Connector 4">
             <a:extLst>
               <a:ext uri="{FF2B5EF4-FFF2-40B4-BE49-F238E27FC236}">
-                <a16:creationId xmlns:a16="http://schemas.microsoft.com/office/drawing/2014/main" id="{15E548BE-9DD8-4A3E-8C63-32F93D043230}"/>
+                <a16:creationId xmlns:a16="http://schemas.microsoft.com/office/drawing/2014/main" id="{23E10C64-9FEB-48D6-8A85-024A4C37BFCB}"/>
               </a:ext>
             </a:extLst>
           </p:cNvPr>
-          <p:cNvGrpSpPr/>
+          <p:cNvCxnSpPr>
+            <a:cxnSpLocks/>
+            <a:endCxn id="35" idx="6"/>
+          </p:cNvCxnSpPr>
           <p:nvPr/>
-        </p:nvGrpSpPr>
-        <p:grpSpPr>
+        </p:nvCxnSpPr>
+        <p:spPr>
+          <a:xfrm flipH="1">
+            <a:off x="6474392" y="3765894"/>
+            <a:ext cx="214812" cy="6156"/>
+          </a:xfrm>
+          <a:prstGeom prst="line">
+            <a:avLst/>
+          </a:prstGeom>
+          <a:ln w="12700">
+            <a:solidFill>
+              <a:schemeClr val="tx1"/>
+            </a:solidFill>
+          </a:ln>
+        </p:spPr>
+        <p:style>
+          <a:lnRef idx="1">
+            <a:schemeClr val="accent1"/>
+          </a:lnRef>
+          <a:fillRef idx="0">
+            <a:schemeClr val="accent1"/>
+          </a:fillRef>
+          <a:effectRef idx="0">
+            <a:schemeClr val="accent1"/>
+          </a:effectRef>
+          <a:fontRef idx="minor">
+            <a:schemeClr val="tx1"/>
+          </a:fontRef>
+        </p:style>
+      </p:cxnSp>
+      <p:sp>
+        <p:nvSpPr>
+          <p:cNvPr id="27" name="TextBox 26">
+            <a:extLst>
+              <a:ext uri="{FF2B5EF4-FFF2-40B4-BE49-F238E27FC236}">
+                <a16:creationId xmlns:a16="http://schemas.microsoft.com/office/drawing/2014/main" id="{EFCD44AA-0FA2-4A03-937E-25C9E40D46BD}"/>
+              </a:ext>
+            </a:extLst>
+          </p:cNvPr>
+          <p:cNvSpPr txBox="1"/>
+          <p:nvPr/>
+        </p:nvSpPr>
+        <p:spPr>
           <a:xfrm>
-            <a:off x="6209673" y="4919970"/>
-            <a:ext cx="1728915" cy="741869"/>
-            <a:chOff x="6209673" y="5621278"/>
-            <a:chExt cx="1728915" cy="741869"/>
+            <a:off x="4428692" y="896943"/>
+            <a:ext cx="2142705" cy="369332"/>
           </a:xfrm>
-        </p:grpSpPr>
-        <p:sp>
-          <p:nvSpPr>
-            <p:cNvPr id="106" name="Rectangle 105">
-              <a:extLst>
-                <a:ext uri="{FF2B5EF4-FFF2-40B4-BE49-F238E27FC236}">
-                  <a16:creationId xmlns:a16="http://schemas.microsoft.com/office/drawing/2014/main" id="{3E5BF232-E4B0-409B-9127-320EA22F48E7}"/>
-                </a:ext>
-              </a:extLst>
-            </p:cNvPr>
-            <p:cNvSpPr/>
-            <p:nvPr/>
-          </p:nvSpPr>
-          <p:spPr>
-            <a:xfrm>
-              <a:off x="6209673" y="5621278"/>
-              <a:ext cx="1728915" cy="741869"/>
-            </a:xfrm>
-            <a:prstGeom prst="rect">
+          <a:prstGeom prst="rect">
+            <a:avLst/>
+          </a:prstGeom>
+          <a:solidFill>
+            <a:srgbClr val="FFFF00"/>
+          </a:solidFill>
+        </p:spPr>
+        <p:txBody>
+          <a:bodyPr wrap="square" rtlCol="0">
+            <a:spAutoFit/>
+          </a:bodyPr>
+          <a:lstStyle/>
+          <a:p>
+            <a:r>
+              <a:rPr lang="en-US" dirty="0"/>
+              <a:t>I/F = RPC interface</a:t>
+            </a:r>
+          </a:p>
+        </p:txBody>
+      </p:sp>
+      <p:sp>
+        <p:nvSpPr>
+          <p:cNvPr id="10" name="Rectangle 9">
+            <a:extLst>
+              <a:ext uri="{FF2B5EF4-FFF2-40B4-BE49-F238E27FC236}">
+                <a16:creationId xmlns:a16="http://schemas.microsoft.com/office/drawing/2014/main" id="{BEFC421F-E0C9-43A4-96E7-3A41DEA650DE}"/>
+              </a:ext>
+            </a:extLst>
+          </p:cNvPr>
+          <p:cNvSpPr/>
+          <p:nvPr/>
+        </p:nvSpPr>
+        <p:spPr>
+          <a:xfrm>
+            <a:off x="9400893" y="3596424"/>
+            <a:ext cx="806837" cy="518003"/>
+          </a:xfrm>
+          <a:prstGeom prst="rect">
+            <a:avLst/>
+          </a:prstGeom>
+          <a:solidFill>
+            <a:srgbClr val="FFFF00"/>
+          </a:solidFill>
+        </p:spPr>
+        <p:style>
+          <a:lnRef idx="2">
+            <a:schemeClr val="accent1">
+              <a:shade val="50000"/>
+            </a:schemeClr>
+          </a:lnRef>
+          <a:fillRef idx="1">
+            <a:schemeClr val="accent1"/>
+          </a:fillRef>
+          <a:effectRef idx="0">
+            <a:schemeClr val="accent1"/>
+          </a:effectRef>
+          <a:fontRef idx="minor">
+            <a:schemeClr val="lt1"/>
+          </a:fontRef>
+        </p:style>
+        <p:txBody>
+          <a:bodyPr rtlCol="0" anchor="ctr"/>
+          <a:lstStyle/>
+          <a:p>
+            <a:pPr algn="ctr"/>
+            <a:r>
+              <a:rPr lang="en-US" dirty="0">
+                <a:solidFill>
+                  <a:schemeClr val="tx1"/>
+                </a:solidFill>
+              </a:rPr>
+              <a:t>{</a:t>
+            </a:r>
+            <a:r>
+              <a:rPr lang="en-US" dirty="0" err="1">
+                <a:solidFill>
+                  <a:schemeClr val="tx1"/>
+                </a:solidFill>
+              </a:rPr>
+              <a:t>impl</a:t>
+            </a:r>
+            <a:r>
+              <a:rPr lang="en-US" dirty="0">
+                <a:solidFill>
+                  <a:schemeClr val="tx1"/>
+                </a:solidFill>
+              </a:rPr>
+              <a:t>}</a:t>
+            </a:r>
+          </a:p>
+        </p:txBody>
+      </p:sp>
+      <p:sp>
+        <p:nvSpPr>
+          <p:cNvPr id="11" name="Rectangle 10">
+            <a:extLst>
+              <a:ext uri="{FF2B5EF4-FFF2-40B4-BE49-F238E27FC236}">
+                <a16:creationId xmlns:a16="http://schemas.microsoft.com/office/drawing/2014/main" id="{C1C12F37-E519-48CA-AC52-D2ADB5E3D89C}"/>
+              </a:ext>
+            </a:extLst>
+          </p:cNvPr>
+          <p:cNvSpPr/>
+          <p:nvPr/>
+        </p:nvSpPr>
+        <p:spPr>
+          <a:xfrm>
+            <a:off x="7460666" y="3279357"/>
+            <a:ext cx="1373845" cy="518003"/>
+          </a:xfrm>
+          <a:prstGeom prst="rect">
+            <a:avLst/>
+          </a:prstGeom>
+          <a:solidFill>
+            <a:srgbClr val="FFC000"/>
+          </a:solidFill>
+        </p:spPr>
+        <p:style>
+          <a:lnRef idx="2">
+            <a:schemeClr val="accent1">
+              <a:shade val="50000"/>
+            </a:schemeClr>
+          </a:lnRef>
+          <a:fillRef idx="1">
+            <a:schemeClr val="accent1"/>
+          </a:fillRef>
+          <a:effectRef idx="0">
+            <a:schemeClr val="accent1"/>
+          </a:effectRef>
+          <a:fontRef idx="minor">
+            <a:schemeClr val="lt1"/>
+          </a:fontRef>
+        </p:style>
+        <p:txBody>
+          <a:bodyPr rtlCol="0" anchor="ctr"/>
+          <a:lstStyle/>
+          <a:p>
+            <a:pPr algn="ctr"/>
+            <a:r>
+              <a:rPr lang="en-US" dirty="0" err="1">
+                <a:solidFill>
+                  <a:schemeClr val="tx1"/>
+                </a:solidFill>
+              </a:rPr>
+              <a:t>RpcManager</a:t>
+            </a:r>
+            <a:endParaRPr lang="en-US" dirty="0">
+              <a:solidFill>
+                <a:schemeClr val="tx1"/>
+              </a:solidFill>
+            </a:endParaRPr>
+          </a:p>
+        </p:txBody>
+      </p:sp>
+      <p:sp>
+        <p:nvSpPr>
+          <p:cNvPr id="34" name="Rectangle 33">
+            <a:extLst>
+              <a:ext uri="{FF2B5EF4-FFF2-40B4-BE49-F238E27FC236}">
+                <a16:creationId xmlns:a16="http://schemas.microsoft.com/office/drawing/2014/main" id="{025883A8-2555-4883-A33C-E4C7046D86A2}"/>
+              </a:ext>
+            </a:extLst>
+          </p:cNvPr>
+          <p:cNvSpPr/>
+          <p:nvPr/>
+        </p:nvSpPr>
+        <p:spPr>
+          <a:xfrm>
+            <a:off x="2087617" y="3487773"/>
+            <a:ext cx="1402926" cy="518003"/>
+          </a:xfrm>
+          <a:prstGeom prst="rect">
+            <a:avLst/>
+          </a:prstGeom>
+          <a:solidFill>
+            <a:srgbClr val="FFC000"/>
+          </a:solidFill>
+        </p:spPr>
+        <p:style>
+          <a:lnRef idx="2">
+            <a:schemeClr val="accent1">
+              <a:shade val="50000"/>
+            </a:schemeClr>
+          </a:lnRef>
+          <a:fillRef idx="1">
+            <a:schemeClr val="accent1"/>
+          </a:fillRef>
+          <a:effectRef idx="0">
+            <a:schemeClr val="accent1"/>
+          </a:effectRef>
+          <a:fontRef idx="minor">
+            <a:schemeClr val="lt1"/>
+          </a:fontRef>
+        </p:style>
+        <p:txBody>
+          <a:bodyPr rtlCol="0" anchor="ctr"/>
+          <a:lstStyle/>
+          <a:p>
+            <a:pPr algn="ctr"/>
+            <a:r>
+              <a:rPr lang="en-US" dirty="0" err="1">
+                <a:solidFill>
+                  <a:schemeClr val="tx1"/>
+                </a:solidFill>
+              </a:rPr>
+              <a:t>RpcManager</a:t>
+            </a:r>
+            <a:endParaRPr lang="en-US" dirty="0">
+              <a:solidFill>
+                <a:schemeClr val="tx1"/>
+              </a:solidFill>
+            </a:endParaRPr>
+          </a:p>
+        </p:txBody>
+      </p:sp>
+      <p:sp>
+        <p:nvSpPr>
+          <p:cNvPr id="37" name="Rectangle 36">
+            <a:extLst>
+              <a:ext uri="{FF2B5EF4-FFF2-40B4-BE49-F238E27FC236}">
+                <a16:creationId xmlns:a16="http://schemas.microsoft.com/office/drawing/2014/main" id="{42F01C13-7B00-4975-B909-7B5CE748506C}"/>
+              </a:ext>
+            </a:extLst>
+          </p:cNvPr>
+          <p:cNvSpPr/>
+          <p:nvPr/>
+        </p:nvSpPr>
+        <p:spPr>
+          <a:xfrm>
+            <a:off x="8874319" y="3043490"/>
+            <a:ext cx="492528" cy="518003"/>
+          </a:xfrm>
+          <a:prstGeom prst="rect">
+            <a:avLst/>
+          </a:prstGeom>
+          <a:solidFill>
+            <a:srgbClr val="FFFF00"/>
+          </a:solidFill>
+        </p:spPr>
+        <p:style>
+          <a:lnRef idx="2">
+            <a:schemeClr val="accent1">
+              <a:shade val="50000"/>
+            </a:schemeClr>
+          </a:lnRef>
+          <a:fillRef idx="1">
+            <a:schemeClr val="accent1"/>
+          </a:fillRef>
+          <a:effectRef idx="0">
+            <a:schemeClr val="accent1"/>
+          </a:effectRef>
+          <a:fontRef idx="minor">
+            <a:schemeClr val="lt1"/>
+          </a:fontRef>
+        </p:style>
+        <p:txBody>
+          <a:bodyPr rtlCol="0" anchor="ctr"/>
+          <a:lstStyle/>
+          <a:p>
+            <a:pPr algn="ctr"/>
+            <a:r>
+              <a:rPr lang="en-US" dirty="0">
+                <a:solidFill>
+                  <a:schemeClr val="tx1"/>
+                </a:solidFill>
+              </a:rPr>
+              <a:t>I/F</a:t>
+            </a:r>
+          </a:p>
+        </p:txBody>
+      </p:sp>
+      <p:sp>
+        <p:nvSpPr>
+          <p:cNvPr id="38" name="Rectangle 37">
+            <a:extLst>
+              <a:ext uri="{FF2B5EF4-FFF2-40B4-BE49-F238E27FC236}">
+                <a16:creationId xmlns:a16="http://schemas.microsoft.com/office/drawing/2014/main" id="{3B367103-D234-4DA4-9226-829A3EAD1607}"/>
+              </a:ext>
+            </a:extLst>
+          </p:cNvPr>
+          <p:cNvSpPr/>
+          <p:nvPr/>
+        </p:nvSpPr>
+        <p:spPr>
+          <a:xfrm>
+            <a:off x="1567936" y="2989738"/>
+            <a:ext cx="492528" cy="463234"/>
+          </a:xfrm>
+          <a:prstGeom prst="rect">
+            <a:avLst/>
+          </a:prstGeom>
+          <a:solidFill>
+            <a:srgbClr val="FFFF00"/>
+          </a:solidFill>
+        </p:spPr>
+        <p:style>
+          <a:lnRef idx="2">
+            <a:schemeClr val="accent1">
+              <a:shade val="50000"/>
+            </a:schemeClr>
+          </a:lnRef>
+          <a:fillRef idx="1">
+            <a:schemeClr val="accent1"/>
+          </a:fillRef>
+          <a:effectRef idx="0">
+            <a:schemeClr val="accent1"/>
+          </a:effectRef>
+          <a:fontRef idx="minor">
+            <a:schemeClr val="lt1"/>
+          </a:fontRef>
+        </p:style>
+        <p:txBody>
+          <a:bodyPr rtlCol="0" anchor="ctr"/>
+          <a:lstStyle/>
+          <a:p>
+            <a:pPr algn="ctr"/>
+            <a:r>
+              <a:rPr lang="en-US" dirty="0">
+                <a:solidFill>
+                  <a:schemeClr val="tx1"/>
+                </a:solidFill>
+              </a:rPr>
+              <a:t>I/F</a:t>
+            </a:r>
+          </a:p>
+        </p:txBody>
+      </p:sp>
+      <p:sp>
+        <p:nvSpPr>
+          <p:cNvPr id="14" name="TextBox 13">
+            <a:extLst>
+              <a:ext uri="{FF2B5EF4-FFF2-40B4-BE49-F238E27FC236}">
+                <a16:creationId xmlns:a16="http://schemas.microsoft.com/office/drawing/2014/main" id="{512D62FC-0CFF-48ED-A553-CDD39D1D4C37}"/>
+              </a:ext>
+            </a:extLst>
+          </p:cNvPr>
+          <p:cNvSpPr txBox="1"/>
+          <p:nvPr/>
+        </p:nvSpPr>
+        <p:spPr>
+          <a:xfrm>
+            <a:off x="844140" y="3038633"/>
+            <a:ext cx="682975" cy="369332"/>
+          </a:xfrm>
+          <a:prstGeom prst="rect">
+            <a:avLst/>
+          </a:prstGeom>
+          <a:solidFill>
+            <a:srgbClr val="FFFF00"/>
+          </a:solidFill>
+          <a:ln>
+            <a:solidFill>
+              <a:schemeClr val="tx1"/>
+            </a:solidFill>
+          </a:ln>
+        </p:spPr>
+        <p:txBody>
+          <a:bodyPr wrap="square" rtlCol="0">
+            <a:spAutoFit/>
+          </a:bodyPr>
+          <a:lstStyle/>
+          <a:p>
+            <a:r>
+              <a:rPr lang="en-US" dirty="0"/>
+              <a:t>{call}</a:t>
+            </a:r>
+          </a:p>
+        </p:txBody>
+      </p:sp>
+      <p:sp>
+        <p:nvSpPr>
+          <p:cNvPr id="15" name="TextBox 14">
+            <a:extLst>
+              <a:ext uri="{FF2B5EF4-FFF2-40B4-BE49-F238E27FC236}">
+                <a16:creationId xmlns:a16="http://schemas.microsoft.com/office/drawing/2014/main" id="{B8DC5225-7729-4418-AADE-03C4CB9EA8FD}"/>
+              </a:ext>
+            </a:extLst>
+          </p:cNvPr>
+          <p:cNvSpPr txBox="1"/>
+          <p:nvPr/>
+        </p:nvSpPr>
+        <p:spPr>
+          <a:xfrm>
+            <a:off x="4720386" y="6014801"/>
+            <a:ext cx="1425110" cy="646331"/>
+          </a:xfrm>
+          <a:prstGeom prst="rect">
+            <a:avLst/>
+          </a:prstGeom>
+          <a:noFill/>
+        </p:spPr>
+        <p:txBody>
+          <a:bodyPr wrap="square" rtlCol="0">
+            <a:spAutoFit/>
+          </a:bodyPr>
+          <a:lstStyle/>
+          <a:p>
+            <a:pPr algn="ctr"/>
+            <a:r>
+              <a:rPr lang="en-US" dirty="0"/>
+              <a:t>Configured Transport</a:t>
+            </a:r>
+          </a:p>
+        </p:txBody>
+      </p:sp>
+      <p:cxnSp>
+        <p:nvCxnSpPr>
+          <p:cNvPr id="17" name="Straight Connector 16">
+            <a:extLst>
+              <a:ext uri="{FF2B5EF4-FFF2-40B4-BE49-F238E27FC236}">
+                <a16:creationId xmlns:a16="http://schemas.microsoft.com/office/drawing/2014/main" id="{0CB25B62-3E9D-433B-A66F-35917F02154A}"/>
+              </a:ext>
+            </a:extLst>
+          </p:cNvPr>
+          <p:cNvCxnSpPr>
+            <a:cxnSpLocks/>
+          </p:cNvCxnSpPr>
+          <p:nvPr/>
+        </p:nvCxnSpPr>
+        <p:spPr>
+          <a:xfrm flipH="1" flipV="1">
+            <a:off x="4720386" y="3340567"/>
+            <a:ext cx="1407210" cy="4540"/>
+          </a:xfrm>
+          <a:prstGeom prst="line">
+            <a:avLst/>
+          </a:prstGeom>
+          <a:ln w="12700">
+            <a:solidFill>
+              <a:schemeClr val="bg1">
+                <a:lumMod val="50000"/>
+              </a:schemeClr>
+            </a:solidFill>
+            <a:prstDash val="dash"/>
+            <a:headEnd type="arrow"/>
+          </a:ln>
+        </p:spPr>
+        <p:style>
+          <a:lnRef idx="1">
+            <a:schemeClr val="accent1"/>
+          </a:lnRef>
+          <a:fillRef idx="0">
+            <a:schemeClr val="accent1"/>
+          </a:fillRef>
+          <a:effectRef idx="0">
+            <a:schemeClr val="accent1"/>
+          </a:effectRef>
+          <a:fontRef idx="minor">
+            <a:schemeClr val="tx1"/>
+          </a:fontRef>
+        </p:style>
+      </p:cxnSp>
+      <p:sp>
+        <p:nvSpPr>
+          <p:cNvPr id="21" name="Arc 20">
+            <a:extLst>
+              <a:ext uri="{FF2B5EF4-FFF2-40B4-BE49-F238E27FC236}">
+                <a16:creationId xmlns:a16="http://schemas.microsoft.com/office/drawing/2014/main" id="{52FE0217-0A79-44C6-9C51-8916A088A5D9}"/>
+              </a:ext>
+            </a:extLst>
+          </p:cNvPr>
+          <p:cNvSpPr/>
+          <p:nvPr/>
+        </p:nvSpPr>
+        <p:spPr>
+          <a:xfrm rot="10800000">
+            <a:off x="4435415" y="3175560"/>
+            <a:ext cx="345042" cy="354369"/>
+          </a:xfrm>
+          <a:prstGeom prst="arc">
+            <a:avLst>
+              <a:gd name="adj1" fmla="val 16200000"/>
+              <a:gd name="adj2" fmla="val 5657069"/>
+            </a:avLst>
+          </a:prstGeom>
+          <a:ln w="12700">
+            <a:solidFill>
+              <a:schemeClr val="tx1"/>
+            </a:solidFill>
+          </a:ln>
+        </p:spPr>
+        <p:style>
+          <a:lnRef idx="1">
+            <a:schemeClr val="accent1"/>
+          </a:lnRef>
+          <a:fillRef idx="0">
+            <a:schemeClr val="accent1"/>
+          </a:fillRef>
+          <a:effectRef idx="0">
+            <a:schemeClr val="accent1"/>
+          </a:effectRef>
+          <a:fontRef idx="minor">
+            <a:schemeClr val="tx1"/>
+          </a:fontRef>
+        </p:style>
+        <p:txBody>
+          <a:bodyPr rtlCol="0" anchor="ctr"/>
+          <a:lstStyle/>
+          <a:p>
+            <a:pPr algn="ctr"/>
+            <a:endParaRPr lang="en-US"/>
+          </a:p>
+        </p:txBody>
+      </p:sp>
+      <p:sp>
+        <p:nvSpPr>
+          <p:cNvPr id="35" name="Oval 34">
+            <a:extLst>
+              <a:ext uri="{FF2B5EF4-FFF2-40B4-BE49-F238E27FC236}">
+                <a16:creationId xmlns:a16="http://schemas.microsoft.com/office/drawing/2014/main" id="{F39961DD-AABC-428E-B62A-217319F3ED64}"/>
+              </a:ext>
+            </a:extLst>
+          </p:cNvPr>
+          <p:cNvSpPr/>
+          <p:nvPr/>
+        </p:nvSpPr>
+        <p:spPr>
+          <a:xfrm>
+            <a:off x="6187819" y="3631224"/>
+            <a:ext cx="286573" cy="281652"/>
+          </a:xfrm>
+          <a:prstGeom prst="ellipse">
+            <a:avLst/>
+          </a:prstGeom>
+          <a:noFill/>
+          <a:ln>
+            <a:solidFill>
+              <a:schemeClr val="tx1"/>
+            </a:solidFill>
+          </a:ln>
+        </p:spPr>
+        <p:style>
+          <a:lnRef idx="2">
+            <a:schemeClr val="accent1">
+              <a:shade val="50000"/>
+            </a:schemeClr>
+          </a:lnRef>
+          <a:fillRef idx="1">
+            <a:schemeClr val="accent1"/>
+          </a:fillRef>
+          <a:effectRef idx="0">
+            <a:schemeClr val="accent1"/>
+          </a:effectRef>
+          <a:fontRef idx="minor">
+            <a:schemeClr val="lt1"/>
+          </a:fontRef>
+        </p:style>
+        <p:txBody>
+          <a:bodyPr rtlCol="0" anchor="ctr"/>
+          <a:lstStyle/>
+          <a:p>
+            <a:pPr algn="ctr"/>
+            <a:endParaRPr lang="en-US"/>
+          </a:p>
+        </p:txBody>
+      </p:sp>
+      <p:sp>
+        <p:nvSpPr>
+          <p:cNvPr id="46" name="Rectangle: Rounded Corners 45">
+            <a:extLst>
+              <a:ext uri="{FF2B5EF4-FFF2-40B4-BE49-F238E27FC236}">
+                <a16:creationId xmlns:a16="http://schemas.microsoft.com/office/drawing/2014/main" id="{634CE7D7-EA24-45CD-9C47-AA2DFF61F15C}"/>
+              </a:ext>
+            </a:extLst>
+          </p:cNvPr>
+          <p:cNvSpPr/>
+          <p:nvPr/>
+        </p:nvSpPr>
+        <p:spPr>
+          <a:xfrm>
+            <a:off x="3522287" y="3229207"/>
+            <a:ext cx="590603" cy="232779"/>
+          </a:xfrm>
+          <a:prstGeom prst="roundRect">
+            <a:avLst/>
+          </a:prstGeom>
+          <a:solidFill>
+            <a:schemeClr val="bg1">
+              <a:lumMod val="65000"/>
+            </a:schemeClr>
+          </a:solidFill>
+        </p:spPr>
+        <p:style>
+          <a:lnRef idx="2">
+            <a:schemeClr val="accent1">
+              <a:shade val="50000"/>
+            </a:schemeClr>
+          </a:lnRef>
+          <a:fillRef idx="1">
+            <a:schemeClr val="accent1"/>
+          </a:fillRef>
+          <a:effectRef idx="0">
+            <a:schemeClr val="accent1"/>
+          </a:effectRef>
+          <a:fontRef idx="minor">
+            <a:schemeClr val="lt1"/>
+          </a:fontRef>
+        </p:style>
+        <p:txBody>
+          <a:bodyPr rtlCol="0" anchor="ctr">
+            <a:normAutofit fontScale="47500" lnSpcReduction="20000"/>
+          </a:bodyPr>
+          <a:lstStyle/>
+          <a:p>
+            <a:pPr algn="ctr"/>
+            <a:r>
+              <a:rPr lang="en-US" dirty="0"/>
+              <a:t>stub</a:t>
+            </a:r>
+          </a:p>
+        </p:txBody>
+      </p:sp>
+      <p:sp>
+        <p:nvSpPr>
+          <p:cNvPr id="64" name="Rectangle: Rounded Corners 63">
+            <a:extLst>
+              <a:ext uri="{FF2B5EF4-FFF2-40B4-BE49-F238E27FC236}">
+                <a16:creationId xmlns:a16="http://schemas.microsoft.com/office/drawing/2014/main" id="{B284526C-4432-421F-A495-C9BB6F344D44}"/>
+              </a:ext>
+            </a:extLst>
+          </p:cNvPr>
+          <p:cNvSpPr/>
+          <p:nvPr/>
+        </p:nvSpPr>
+        <p:spPr>
+          <a:xfrm>
+            <a:off x="6671632" y="3221355"/>
+            <a:ext cx="769793" cy="232779"/>
+          </a:xfrm>
+          <a:prstGeom prst="roundRect">
+            <a:avLst/>
+          </a:prstGeom>
+          <a:solidFill>
+            <a:schemeClr val="bg1">
+              <a:lumMod val="65000"/>
+            </a:schemeClr>
+          </a:solidFill>
+        </p:spPr>
+        <p:style>
+          <a:lnRef idx="2">
+            <a:schemeClr val="accent1">
+              <a:shade val="50000"/>
+            </a:schemeClr>
+          </a:lnRef>
+          <a:fillRef idx="1">
+            <a:schemeClr val="accent1"/>
+          </a:fillRef>
+          <a:effectRef idx="0">
+            <a:schemeClr val="accent1"/>
+          </a:effectRef>
+          <a:fontRef idx="minor">
+            <a:schemeClr val="lt1"/>
+          </a:fontRef>
+        </p:style>
+        <p:txBody>
+          <a:bodyPr rtlCol="0" anchor="ctr">
+            <a:normAutofit fontScale="47500" lnSpcReduction="20000"/>
+          </a:bodyPr>
+          <a:lstStyle/>
+          <a:p>
+            <a:pPr algn="ctr"/>
+            <a:r>
+              <a:rPr lang="en-US" dirty="0"/>
+              <a:t>dispatch</a:t>
+            </a:r>
+          </a:p>
+        </p:txBody>
+      </p:sp>
+      <p:cxnSp>
+        <p:nvCxnSpPr>
+          <p:cNvPr id="69" name="Straight Connector 68">
+            <a:extLst>
+              <a:ext uri="{FF2B5EF4-FFF2-40B4-BE49-F238E27FC236}">
+                <a16:creationId xmlns:a16="http://schemas.microsoft.com/office/drawing/2014/main" id="{D318B453-2AAA-4695-A878-AF1BD6FFBB1D}"/>
+              </a:ext>
+            </a:extLst>
+          </p:cNvPr>
+          <p:cNvCxnSpPr>
+            <a:cxnSpLocks/>
+          </p:cNvCxnSpPr>
+          <p:nvPr/>
+        </p:nvCxnSpPr>
+        <p:spPr>
+          <a:xfrm flipH="1">
+            <a:off x="4112890" y="3345107"/>
+            <a:ext cx="320019" cy="6156"/>
+          </a:xfrm>
+          <a:prstGeom prst="line">
+            <a:avLst/>
+          </a:prstGeom>
+          <a:ln w="12700">
+            <a:solidFill>
+              <a:schemeClr val="tx1"/>
+            </a:solidFill>
+          </a:ln>
+        </p:spPr>
+        <p:style>
+          <a:lnRef idx="1">
+            <a:schemeClr val="accent1"/>
+          </a:lnRef>
+          <a:fillRef idx="0">
+            <a:schemeClr val="accent1"/>
+          </a:fillRef>
+          <a:effectRef idx="0">
+            <a:schemeClr val="accent1"/>
+          </a:effectRef>
+          <a:fontRef idx="minor">
+            <a:schemeClr val="tx1"/>
+          </a:fontRef>
+        </p:style>
+      </p:cxnSp>
+      <p:sp>
+        <p:nvSpPr>
+          <p:cNvPr id="19" name="Rectangle 18">
+            <a:extLst>
+              <a:ext uri="{FF2B5EF4-FFF2-40B4-BE49-F238E27FC236}">
+                <a16:creationId xmlns:a16="http://schemas.microsoft.com/office/drawing/2014/main" id="{34412E67-85C3-4B5C-9B9F-A83F246AE723}"/>
+              </a:ext>
+            </a:extLst>
+          </p:cNvPr>
+          <p:cNvSpPr/>
+          <p:nvPr/>
+        </p:nvSpPr>
+        <p:spPr>
+          <a:xfrm>
+            <a:off x="7158450" y="4408337"/>
+            <a:ext cx="3147600" cy="1476695"/>
+          </a:xfrm>
+          <a:prstGeom prst="rect">
+            <a:avLst/>
+          </a:prstGeom>
+          <a:solidFill>
+            <a:srgbClr val="00B050"/>
+          </a:solidFill>
+          <a:ln>
+            <a:solidFill>
+              <a:schemeClr val="tx1"/>
+            </a:solidFill>
+          </a:ln>
+        </p:spPr>
+        <p:txBody>
+          <a:bodyPr rot="0" spcFirstLastPara="0" vertOverflow="overflow" horzOverflow="overflow" vert="horz" wrap="square" lIns="91440" tIns="45720" rIns="91440" bIns="45720" numCol="1" spcCol="0" rtlCol="0" fromWordArt="0" anchor="t" anchorCtr="1" forceAA="0" compatLnSpc="1">
+            <a:prstTxWarp prst="textNoShape">
               <a:avLst/>
-            </a:prstGeom>
+            </a:prstTxWarp>
+            <a:noAutofit/>
+          </a:bodyPr>
+          <a:lstStyle/>
+          <a:p>
+            <a:pPr algn="ctr"/>
+            <a:r>
+              <a:rPr lang="en-US" kern="0" dirty="0">
+                <a:solidFill>
+                  <a:prstClr val="black"/>
+                </a:solidFill>
+                <a:latin typeface="Calibri" panose="020F0502020204030204"/>
+              </a:rPr>
+              <a:t>Server2</a:t>
+            </a:r>
+          </a:p>
+        </p:txBody>
+      </p:sp>
+      <p:cxnSp>
+        <p:nvCxnSpPr>
+          <p:cNvPr id="20" name="Straight Connector 19">
+            <a:extLst>
+              <a:ext uri="{FF2B5EF4-FFF2-40B4-BE49-F238E27FC236}">
+                <a16:creationId xmlns:a16="http://schemas.microsoft.com/office/drawing/2014/main" id="{0DAB28A7-3EF2-48B5-941D-375A7A092579}"/>
+              </a:ext>
+            </a:extLst>
+          </p:cNvPr>
+          <p:cNvCxnSpPr>
+            <a:cxnSpLocks/>
+            <a:endCxn id="25" idx="6"/>
+          </p:cNvCxnSpPr>
+          <p:nvPr/>
+        </p:nvCxnSpPr>
+        <p:spPr>
+          <a:xfrm flipH="1">
+            <a:off x="6472969" y="5179114"/>
+            <a:ext cx="214812" cy="6156"/>
+          </a:xfrm>
+          <a:prstGeom prst="line">
+            <a:avLst/>
+          </a:prstGeom>
+          <a:ln w="12700">
             <a:solidFill>
-              <a:srgbClr val="FFCD2F"/>
+              <a:schemeClr val="tx1"/>
             </a:solidFill>
-            <a:ln>
+          </a:ln>
+        </p:spPr>
+        <p:style>
+          <a:lnRef idx="1">
+            <a:schemeClr val="accent1"/>
+          </a:lnRef>
+          <a:fillRef idx="0">
+            <a:schemeClr val="accent1"/>
+          </a:fillRef>
+          <a:effectRef idx="0">
+            <a:schemeClr val="accent1"/>
+          </a:effectRef>
+          <a:fontRef idx="minor">
+            <a:schemeClr val="tx1"/>
+          </a:fontRef>
+        </p:style>
+      </p:cxnSp>
+      <p:sp>
+        <p:nvSpPr>
+          <p:cNvPr id="22" name="Rectangle 21">
+            <a:extLst>
+              <a:ext uri="{FF2B5EF4-FFF2-40B4-BE49-F238E27FC236}">
+                <a16:creationId xmlns:a16="http://schemas.microsoft.com/office/drawing/2014/main" id="{D83062AD-C07E-4F3C-BA92-BF81FDFE4FA2}"/>
+              </a:ext>
+            </a:extLst>
+          </p:cNvPr>
+          <p:cNvSpPr/>
+          <p:nvPr/>
+        </p:nvSpPr>
+        <p:spPr>
+          <a:xfrm>
+            <a:off x="9394069" y="4881476"/>
+            <a:ext cx="806837" cy="518003"/>
+          </a:xfrm>
+          <a:prstGeom prst="rect">
+            <a:avLst/>
+          </a:prstGeom>
+          <a:solidFill>
+            <a:srgbClr val="FFFF00"/>
+          </a:solidFill>
+        </p:spPr>
+        <p:style>
+          <a:lnRef idx="2">
+            <a:schemeClr val="accent1">
+              <a:shade val="50000"/>
+            </a:schemeClr>
+          </a:lnRef>
+          <a:fillRef idx="1">
+            <a:schemeClr val="accent1"/>
+          </a:fillRef>
+          <a:effectRef idx="0">
+            <a:schemeClr val="accent1"/>
+          </a:effectRef>
+          <a:fontRef idx="minor">
+            <a:schemeClr val="lt1"/>
+          </a:fontRef>
+        </p:style>
+        <p:txBody>
+          <a:bodyPr rtlCol="0" anchor="ctr"/>
+          <a:lstStyle/>
+          <a:p>
+            <a:pPr algn="ctr"/>
+            <a:r>
+              <a:rPr lang="en-US" dirty="0">
+                <a:solidFill>
+                  <a:schemeClr val="tx1"/>
+                </a:solidFill>
+              </a:rPr>
+              <a:t>{</a:t>
+            </a:r>
+            <a:r>
+              <a:rPr lang="en-US" dirty="0" err="1">
+                <a:solidFill>
+                  <a:schemeClr val="tx1"/>
+                </a:solidFill>
+              </a:rPr>
+              <a:t>impl</a:t>
+            </a:r>
+            <a:r>
+              <a:rPr lang="en-US" dirty="0">
+                <a:solidFill>
+                  <a:schemeClr val="tx1"/>
+                </a:solidFill>
+              </a:rPr>
+              <a:t>}</a:t>
+            </a:r>
+          </a:p>
+        </p:txBody>
+      </p:sp>
+      <p:sp>
+        <p:nvSpPr>
+          <p:cNvPr id="23" name="Rectangle 22">
+            <a:extLst>
+              <a:ext uri="{FF2B5EF4-FFF2-40B4-BE49-F238E27FC236}">
+                <a16:creationId xmlns:a16="http://schemas.microsoft.com/office/drawing/2014/main" id="{70ACFF18-88EC-4A09-A0B6-8D0A4EB2C6D5}"/>
+              </a:ext>
+            </a:extLst>
+          </p:cNvPr>
+          <p:cNvSpPr/>
+          <p:nvPr/>
+        </p:nvSpPr>
+        <p:spPr>
+          <a:xfrm>
+            <a:off x="7479024" y="4881476"/>
+            <a:ext cx="1373845" cy="518003"/>
+          </a:xfrm>
+          <a:prstGeom prst="rect">
+            <a:avLst/>
+          </a:prstGeom>
+          <a:solidFill>
+            <a:srgbClr val="FFC000"/>
+          </a:solidFill>
+        </p:spPr>
+        <p:style>
+          <a:lnRef idx="2">
+            <a:schemeClr val="accent1">
+              <a:shade val="50000"/>
+            </a:schemeClr>
+          </a:lnRef>
+          <a:fillRef idx="1">
+            <a:schemeClr val="accent1"/>
+          </a:fillRef>
+          <a:effectRef idx="0">
+            <a:schemeClr val="accent1"/>
+          </a:effectRef>
+          <a:fontRef idx="minor">
+            <a:schemeClr val="lt1"/>
+          </a:fontRef>
+        </p:style>
+        <p:txBody>
+          <a:bodyPr rtlCol="0" anchor="ctr"/>
+          <a:lstStyle/>
+          <a:p>
+            <a:pPr algn="ctr"/>
+            <a:r>
+              <a:rPr lang="en-US" dirty="0" err="1">
+                <a:solidFill>
+                  <a:schemeClr val="tx1"/>
+                </a:solidFill>
+              </a:rPr>
+              <a:t>RpcManager</a:t>
+            </a:r>
+            <a:endParaRPr lang="en-US" dirty="0">
               <a:solidFill>
-                <a:sysClr val="windowText" lastClr="000000"/>
+                <a:schemeClr val="tx1"/>
               </a:solidFill>
-            </a:ln>
-          </p:spPr>
-          <p:txBody>
-            <a:bodyPr rot="0" spcFirstLastPara="0" vertOverflow="overflow" horzOverflow="overflow" vert="horz" wrap="square" lIns="91440" tIns="45720" rIns="91440" bIns="45720" numCol="1" spcCol="0" rtlCol="0" fromWordArt="0" anchor="t" anchorCtr="1" forceAA="0" compatLnSpc="1">
-              <a:prstTxWarp prst="textNoShape">
-                <a:avLst/>
-              </a:prstTxWarp>
-              <a:noAutofit/>
-            </a:bodyPr>
-            <a:lstStyle/>
-            <a:p>
-              <a:pPr algn="ctr"/>
-              <a:r>
-                <a:rPr lang="en-US" sz="1400" kern="0" dirty="0">
-                  <a:solidFill>
-                    <a:prstClr val="black"/>
-                  </a:solidFill>
-                  <a:latin typeface="Calibri" panose="020F0502020204030204"/>
-                </a:rPr>
-                <a:t>RPC Manager</a:t>
-              </a:r>
-            </a:p>
-          </p:txBody>
-        </p:sp>
-        <p:sp>
-          <p:nvSpPr>
-            <p:cNvPr id="107" name="Rectangle 106">
-              <a:extLst>
-                <a:ext uri="{FF2B5EF4-FFF2-40B4-BE49-F238E27FC236}">
-                  <a16:creationId xmlns:a16="http://schemas.microsoft.com/office/drawing/2014/main" id="{1056AC41-F880-49E8-987B-1034367F56DD}"/>
-                </a:ext>
-              </a:extLst>
-            </p:cNvPr>
-            <p:cNvSpPr/>
-            <p:nvPr/>
-          </p:nvSpPr>
-          <p:spPr>
-            <a:xfrm>
-              <a:off x="6459767" y="5928560"/>
-              <a:ext cx="1228726" cy="324296"/>
-            </a:xfrm>
-            <a:prstGeom prst="rect">
-              <a:avLst/>
-            </a:prstGeom>
+            </a:endParaRPr>
+          </a:p>
+        </p:txBody>
+      </p:sp>
+      <p:sp>
+        <p:nvSpPr>
+          <p:cNvPr id="24" name="Rectangle 23">
+            <a:extLst>
+              <a:ext uri="{FF2B5EF4-FFF2-40B4-BE49-F238E27FC236}">
+                <a16:creationId xmlns:a16="http://schemas.microsoft.com/office/drawing/2014/main" id="{A57D96C8-EB90-4CB5-BD4E-D0388DAD9D08}"/>
+              </a:ext>
+            </a:extLst>
+          </p:cNvPr>
+          <p:cNvSpPr/>
+          <p:nvPr/>
+        </p:nvSpPr>
+        <p:spPr>
+          <a:xfrm>
+            <a:off x="8874319" y="4881476"/>
+            <a:ext cx="492528" cy="518003"/>
+          </a:xfrm>
+          <a:prstGeom prst="rect">
+            <a:avLst/>
+          </a:prstGeom>
+          <a:solidFill>
+            <a:srgbClr val="FFFF00"/>
+          </a:solidFill>
+        </p:spPr>
+        <p:style>
+          <a:lnRef idx="2">
+            <a:schemeClr val="accent1">
+              <a:shade val="50000"/>
+            </a:schemeClr>
+          </a:lnRef>
+          <a:fillRef idx="1">
+            <a:schemeClr val="accent1"/>
+          </a:fillRef>
+          <a:effectRef idx="0">
+            <a:schemeClr val="accent1"/>
+          </a:effectRef>
+          <a:fontRef idx="minor">
+            <a:schemeClr val="lt1"/>
+          </a:fontRef>
+        </p:style>
+        <p:txBody>
+          <a:bodyPr rtlCol="0" anchor="ctr"/>
+          <a:lstStyle/>
+          <a:p>
+            <a:pPr algn="ctr"/>
+            <a:r>
+              <a:rPr lang="en-US" dirty="0">
+                <a:solidFill>
+                  <a:schemeClr val="tx1"/>
+                </a:solidFill>
+              </a:rPr>
+              <a:t>I/F</a:t>
+            </a:r>
+          </a:p>
+        </p:txBody>
+      </p:sp>
+      <p:sp>
+        <p:nvSpPr>
+          <p:cNvPr id="25" name="Oval 24">
+            <a:extLst>
+              <a:ext uri="{FF2B5EF4-FFF2-40B4-BE49-F238E27FC236}">
+                <a16:creationId xmlns:a16="http://schemas.microsoft.com/office/drawing/2014/main" id="{A6BA0B9F-E121-4A4E-997E-1316F74C35BC}"/>
+              </a:ext>
+            </a:extLst>
+          </p:cNvPr>
+          <p:cNvSpPr/>
+          <p:nvPr/>
+        </p:nvSpPr>
+        <p:spPr>
+          <a:xfrm>
+            <a:off x="6186396" y="5044444"/>
+            <a:ext cx="286573" cy="281652"/>
+          </a:xfrm>
+          <a:prstGeom prst="ellipse">
+            <a:avLst/>
+          </a:prstGeom>
+          <a:noFill/>
+          <a:ln>
             <a:solidFill>
-              <a:srgbClr val="FFFF99"/>
+              <a:schemeClr val="tx1"/>
             </a:solidFill>
-            <a:ln>
-              <a:solidFill>
-                <a:sysClr val="windowText" lastClr="000000"/>
-              </a:solidFill>
-            </a:ln>
-          </p:spPr>
-          <p:txBody>
-            <a:bodyPr rot="0" spcFirstLastPara="0" vertOverflow="overflow" horzOverflow="overflow" vert="horz" wrap="square" lIns="91440" tIns="45720" rIns="91440" bIns="45720" numCol="1" spcCol="0" rtlCol="0" fromWordArt="0" anchor="t" anchorCtr="0" forceAA="0" compatLnSpc="1">
-              <a:prstTxWarp prst="textNoShape">
-                <a:avLst/>
-              </a:prstTxWarp>
-              <a:noAutofit/>
-            </a:bodyPr>
-            <a:lstStyle/>
-            <a:p>
-              <a:pPr algn="ctr"/>
-              <a:r>
-                <a:rPr lang="en-US" sz="1400" kern="0" dirty="0">
-                  <a:solidFill>
-                    <a:prstClr val="black"/>
-                  </a:solidFill>
-                  <a:latin typeface="Calibri" panose="020F0502020204030204"/>
-                </a:rPr>
-                <a:t>Configuration</a:t>
-              </a:r>
-            </a:p>
-          </p:txBody>
-        </p:sp>
-      </p:grpSp>
+          </a:ln>
+        </p:spPr>
+        <p:style>
+          <a:lnRef idx="2">
+            <a:schemeClr val="accent1">
+              <a:shade val="50000"/>
+            </a:schemeClr>
+          </a:lnRef>
+          <a:fillRef idx="1">
+            <a:schemeClr val="accent1"/>
+          </a:fillRef>
+          <a:effectRef idx="0">
+            <a:schemeClr val="accent1"/>
+          </a:effectRef>
+          <a:fontRef idx="minor">
+            <a:schemeClr val="lt1"/>
+          </a:fontRef>
+        </p:style>
+        <p:txBody>
+          <a:bodyPr rtlCol="0" anchor="ctr"/>
+          <a:lstStyle/>
+          <a:p>
+            <a:pPr algn="ctr"/>
+            <a:endParaRPr lang="en-US"/>
+          </a:p>
+        </p:txBody>
+      </p:sp>
+      <p:sp>
+        <p:nvSpPr>
+          <p:cNvPr id="26" name="Rectangle: Rounded Corners 25">
+            <a:extLst>
+              <a:ext uri="{FF2B5EF4-FFF2-40B4-BE49-F238E27FC236}">
+                <a16:creationId xmlns:a16="http://schemas.microsoft.com/office/drawing/2014/main" id="{C6175F5F-4362-4F2A-82A6-437600456CAA}"/>
+              </a:ext>
+            </a:extLst>
+          </p:cNvPr>
+          <p:cNvSpPr/>
+          <p:nvPr/>
+        </p:nvSpPr>
+        <p:spPr>
+          <a:xfrm>
+            <a:off x="6687781" y="5062724"/>
+            <a:ext cx="769793" cy="232779"/>
+          </a:xfrm>
+          <a:prstGeom prst="roundRect">
+            <a:avLst/>
+          </a:prstGeom>
+          <a:solidFill>
+            <a:schemeClr val="bg1">
+              <a:lumMod val="65000"/>
+            </a:schemeClr>
+          </a:solidFill>
+        </p:spPr>
+        <p:style>
+          <a:lnRef idx="2">
+            <a:schemeClr val="accent1">
+              <a:shade val="50000"/>
+            </a:schemeClr>
+          </a:lnRef>
+          <a:fillRef idx="1">
+            <a:schemeClr val="accent1"/>
+          </a:fillRef>
+          <a:effectRef idx="0">
+            <a:schemeClr val="accent1"/>
+          </a:effectRef>
+          <a:fontRef idx="minor">
+            <a:schemeClr val="lt1"/>
+          </a:fontRef>
+        </p:style>
+        <p:txBody>
+          <a:bodyPr rtlCol="0" anchor="ctr">
+            <a:normAutofit fontScale="47500" lnSpcReduction="20000"/>
+          </a:bodyPr>
+          <a:lstStyle/>
+          <a:p>
+            <a:pPr algn="ctr"/>
+            <a:r>
+              <a:rPr lang="en-US" dirty="0"/>
+              <a:t>dispatch</a:t>
+            </a:r>
+          </a:p>
+        </p:txBody>
+      </p:sp>
+      <p:cxnSp>
+        <p:nvCxnSpPr>
+          <p:cNvPr id="28" name="Straight Connector 27">
+            <a:extLst>
+              <a:ext uri="{FF2B5EF4-FFF2-40B4-BE49-F238E27FC236}">
+                <a16:creationId xmlns:a16="http://schemas.microsoft.com/office/drawing/2014/main" id="{89C00301-B6BB-4574-805D-19AF644EE6AD}"/>
+              </a:ext>
+            </a:extLst>
+          </p:cNvPr>
+          <p:cNvCxnSpPr>
+            <a:cxnSpLocks/>
+            <a:endCxn id="29" idx="6"/>
+          </p:cNvCxnSpPr>
+          <p:nvPr/>
+        </p:nvCxnSpPr>
+        <p:spPr>
+          <a:xfrm flipH="1">
+            <a:off x="6465414" y="3340791"/>
+            <a:ext cx="214812" cy="6156"/>
+          </a:xfrm>
+          <a:prstGeom prst="line">
+            <a:avLst/>
+          </a:prstGeom>
+          <a:ln w="12700">
+            <a:solidFill>
+              <a:schemeClr val="tx1"/>
+            </a:solidFill>
+          </a:ln>
+        </p:spPr>
+        <p:style>
+          <a:lnRef idx="1">
+            <a:schemeClr val="accent1"/>
+          </a:lnRef>
+          <a:fillRef idx="0">
+            <a:schemeClr val="accent1"/>
+          </a:fillRef>
+          <a:effectRef idx="0">
+            <a:schemeClr val="accent1"/>
+          </a:effectRef>
+          <a:fontRef idx="minor">
+            <a:schemeClr val="tx1"/>
+          </a:fontRef>
+        </p:style>
+      </p:cxnSp>
+      <p:sp>
+        <p:nvSpPr>
+          <p:cNvPr id="29" name="Oval 28">
+            <a:extLst>
+              <a:ext uri="{FF2B5EF4-FFF2-40B4-BE49-F238E27FC236}">
+                <a16:creationId xmlns:a16="http://schemas.microsoft.com/office/drawing/2014/main" id="{B20ABCDC-F62C-45CA-9BA5-D179B38C37AD}"/>
+              </a:ext>
+            </a:extLst>
+          </p:cNvPr>
+          <p:cNvSpPr/>
+          <p:nvPr/>
+        </p:nvSpPr>
+        <p:spPr>
+          <a:xfrm>
+            <a:off x="6178841" y="3206121"/>
+            <a:ext cx="286573" cy="281652"/>
+          </a:xfrm>
+          <a:prstGeom prst="ellipse">
+            <a:avLst/>
+          </a:prstGeom>
+          <a:noFill/>
+          <a:ln>
+            <a:solidFill>
+              <a:schemeClr val="tx1"/>
+            </a:solidFill>
+          </a:ln>
+        </p:spPr>
+        <p:style>
+          <a:lnRef idx="2">
+            <a:schemeClr val="accent1">
+              <a:shade val="50000"/>
+            </a:schemeClr>
+          </a:lnRef>
+          <a:fillRef idx="1">
+            <a:schemeClr val="accent1"/>
+          </a:fillRef>
+          <a:effectRef idx="0">
+            <a:schemeClr val="accent1"/>
+          </a:effectRef>
+          <a:fontRef idx="minor">
+            <a:schemeClr val="lt1"/>
+          </a:fontRef>
+        </p:style>
+        <p:txBody>
+          <a:bodyPr rtlCol="0" anchor="ctr"/>
+          <a:lstStyle/>
+          <a:p>
+            <a:pPr algn="ctr"/>
+            <a:endParaRPr lang="en-US"/>
+          </a:p>
+        </p:txBody>
+      </p:sp>
+      <p:sp>
+        <p:nvSpPr>
+          <p:cNvPr id="30" name="Rectangle: Rounded Corners 29">
+            <a:extLst>
+              <a:ext uri="{FF2B5EF4-FFF2-40B4-BE49-F238E27FC236}">
+                <a16:creationId xmlns:a16="http://schemas.microsoft.com/office/drawing/2014/main" id="{E0937D3E-2635-4954-ADD9-B1E97F8FCC95}"/>
+              </a:ext>
+            </a:extLst>
+          </p:cNvPr>
+          <p:cNvSpPr/>
+          <p:nvPr/>
+        </p:nvSpPr>
+        <p:spPr>
+          <a:xfrm>
+            <a:off x="6679214" y="3663480"/>
+            <a:ext cx="769793" cy="232779"/>
+          </a:xfrm>
+          <a:prstGeom prst="roundRect">
+            <a:avLst/>
+          </a:prstGeom>
+          <a:solidFill>
+            <a:schemeClr val="bg1">
+              <a:lumMod val="65000"/>
+            </a:schemeClr>
+          </a:solidFill>
+        </p:spPr>
+        <p:style>
+          <a:lnRef idx="2">
+            <a:schemeClr val="accent1">
+              <a:shade val="50000"/>
+            </a:schemeClr>
+          </a:lnRef>
+          <a:fillRef idx="1">
+            <a:schemeClr val="accent1"/>
+          </a:fillRef>
+          <a:effectRef idx="0">
+            <a:schemeClr val="accent1"/>
+          </a:effectRef>
+          <a:fontRef idx="minor">
+            <a:schemeClr val="lt1"/>
+          </a:fontRef>
+        </p:style>
+        <p:txBody>
+          <a:bodyPr rtlCol="0" anchor="ctr">
+            <a:normAutofit fontScale="47500" lnSpcReduction="20000"/>
+          </a:bodyPr>
+          <a:lstStyle/>
+          <a:p>
+            <a:pPr algn="ctr"/>
+            <a:r>
+              <a:rPr lang="en-US" dirty="0"/>
+              <a:t>dispatch</a:t>
+            </a:r>
+          </a:p>
+        </p:txBody>
+      </p:sp>
+      <p:sp>
+        <p:nvSpPr>
+          <p:cNvPr id="31" name="Rectangle 30">
+            <a:extLst>
+              <a:ext uri="{FF2B5EF4-FFF2-40B4-BE49-F238E27FC236}">
+                <a16:creationId xmlns:a16="http://schemas.microsoft.com/office/drawing/2014/main" id="{73EDF0FA-56BC-4545-8D89-05199C8FFCE1}"/>
+              </a:ext>
+            </a:extLst>
+          </p:cNvPr>
+          <p:cNvSpPr/>
+          <p:nvPr/>
+        </p:nvSpPr>
+        <p:spPr>
+          <a:xfrm>
+            <a:off x="8872693" y="3596425"/>
+            <a:ext cx="492528" cy="518003"/>
+          </a:xfrm>
+          <a:prstGeom prst="rect">
+            <a:avLst/>
+          </a:prstGeom>
+          <a:solidFill>
+            <a:srgbClr val="FFFF00"/>
+          </a:solidFill>
+        </p:spPr>
+        <p:style>
+          <a:lnRef idx="2">
+            <a:schemeClr val="accent1">
+              <a:shade val="50000"/>
+            </a:schemeClr>
+          </a:lnRef>
+          <a:fillRef idx="1">
+            <a:schemeClr val="accent1"/>
+          </a:fillRef>
+          <a:effectRef idx="0">
+            <a:schemeClr val="accent1"/>
+          </a:effectRef>
+          <a:fontRef idx="minor">
+            <a:schemeClr val="lt1"/>
+          </a:fontRef>
+        </p:style>
+        <p:txBody>
+          <a:bodyPr rtlCol="0" anchor="ctr"/>
+          <a:lstStyle/>
+          <a:p>
+            <a:pPr algn="ctr"/>
+            <a:r>
+              <a:rPr lang="en-US" dirty="0">
+                <a:solidFill>
+                  <a:schemeClr val="tx1"/>
+                </a:solidFill>
+              </a:rPr>
+              <a:t>I/F</a:t>
+            </a:r>
+          </a:p>
+        </p:txBody>
+      </p:sp>
+      <p:sp>
+        <p:nvSpPr>
+          <p:cNvPr id="32" name="Rectangle 31">
+            <a:extLst>
+              <a:ext uri="{FF2B5EF4-FFF2-40B4-BE49-F238E27FC236}">
+                <a16:creationId xmlns:a16="http://schemas.microsoft.com/office/drawing/2014/main" id="{144DE107-ECB3-4DF8-8DE1-2A25142E43F3}"/>
+              </a:ext>
+            </a:extLst>
+          </p:cNvPr>
+          <p:cNvSpPr/>
+          <p:nvPr/>
+        </p:nvSpPr>
+        <p:spPr>
+          <a:xfrm>
+            <a:off x="9400892" y="3037408"/>
+            <a:ext cx="806837" cy="518003"/>
+          </a:xfrm>
+          <a:prstGeom prst="rect">
+            <a:avLst/>
+          </a:prstGeom>
+          <a:solidFill>
+            <a:srgbClr val="FFFF00"/>
+          </a:solidFill>
+        </p:spPr>
+        <p:style>
+          <a:lnRef idx="2">
+            <a:schemeClr val="accent1">
+              <a:shade val="50000"/>
+            </a:schemeClr>
+          </a:lnRef>
+          <a:fillRef idx="1">
+            <a:schemeClr val="accent1"/>
+          </a:fillRef>
+          <a:effectRef idx="0">
+            <a:schemeClr val="accent1"/>
+          </a:effectRef>
+          <a:fontRef idx="minor">
+            <a:schemeClr val="lt1"/>
+          </a:fontRef>
+        </p:style>
+        <p:txBody>
+          <a:bodyPr rtlCol="0" anchor="ctr"/>
+          <a:lstStyle/>
+          <a:p>
+            <a:pPr algn="ctr"/>
+            <a:r>
+              <a:rPr lang="en-US" dirty="0">
+                <a:solidFill>
+                  <a:schemeClr val="tx1"/>
+                </a:solidFill>
+              </a:rPr>
+              <a:t>{</a:t>
+            </a:r>
+            <a:r>
+              <a:rPr lang="en-US" dirty="0" err="1">
+                <a:solidFill>
+                  <a:schemeClr val="tx1"/>
+                </a:solidFill>
+              </a:rPr>
+              <a:t>impl</a:t>
+            </a:r>
+            <a:r>
+              <a:rPr lang="en-US" dirty="0">
+                <a:solidFill>
+                  <a:schemeClr val="tx1"/>
+                </a:solidFill>
+              </a:rPr>
+              <a:t>}</a:t>
+            </a:r>
+          </a:p>
+        </p:txBody>
+      </p:sp>
+      <p:sp>
+        <p:nvSpPr>
+          <p:cNvPr id="33" name="Rectangle 32">
+            <a:extLst>
+              <a:ext uri="{FF2B5EF4-FFF2-40B4-BE49-F238E27FC236}">
+                <a16:creationId xmlns:a16="http://schemas.microsoft.com/office/drawing/2014/main" id="{2F88B847-D376-4A84-951C-E09D3156E569}"/>
+              </a:ext>
+            </a:extLst>
+          </p:cNvPr>
+          <p:cNvSpPr/>
+          <p:nvPr/>
+        </p:nvSpPr>
+        <p:spPr>
+          <a:xfrm>
+            <a:off x="1567936" y="4014184"/>
+            <a:ext cx="492528" cy="482865"/>
+          </a:xfrm>
+          <a:prstGeom prst="rect">
+            <a:avLst/>
+          </a:prstGeom>
+          <a:solidFill>
+            <a:srgbClr val="FFFF00"/>
+          </a:solidFill>
+        </p:spPr>
+        <p:style>
+          <a:lnRef idx="2">
+            <a:schemeClr val="accent1">
+              <a:shade val="50000"/>
+            </a:schemeClr>
+          </a:lnRef>
+          <a:fillRef idx="1">
+            <a:schemeClr val="accent1"/>
+          </a:fillRef>
+          <a:effectRef idx="0">
+            <a:schemeClr val="accent1"/>
+          </a:effectRef>
+          <a:fontRef idx="minor">
+            <a:schemeClr val="lt1"/>
+          </a:fontRef>
+        </p:style>
+        <p:txBody>
+          <a:bodyPr rtlCol="0" anchor="ctr"/>
+          <a:lstStyle/>
+          <a:p>
+            <a:pPr algn="ctr"/>
+            <a:r>
+              <a:rPr lang="en-US" dirty="0">
+                <a:solidFill>
+                  <a:schemeClr val="tx1"/>
+                </a:solidFill>
+              </a:rPr>
+              <a:t>I/F</a:t>
+            </a:r>
+          </a:p>
+        </p:txBody>
+      </p:sp>
+      <p:sp>
+        <p:nvSpPr>
+          <p:cNvPr id="36" name="TextBox 35">
+            <a:extLst>
+              <a:ext uri="{FF2B5EF4-FFF2-40B4-BE49-F238E27FC236}">
+                <a16:creationId xmlns:a16="http://schemas.microsoft.com/office/drawing/2014/main" id="{B1F6389D-59CA-4B75-88A7-1BB67F470929}"/>
+              </a:ext>
+            </a:extLst>
+          </p:cNvPr>
+          <p:cNvSpPr txBox="1"/>
+          <p:nvPr/>
+        </p:nvSpPr>
+        <p:spPr>
+          <a:xfrm>
+            <a:off x="844140" y="4075081"/>
+            <a:ext cx="682975" cy="369332"/>
+          </a:xfrm>
+          <a:prstGeom prst="rect">
+            <a:avLst/>
+          </a:prstGeom>
+          <a:solidFill>
+            <a:srgbClr val="FFFF00"/>
+          </a:solidFill>
+          <a:ln>
+            <a:solidFill>
+              <a:schemeClr val="tx1"/>
+            </a:solidFill>
+          </a:ln>
+        </p:spPr>
+        <p:txBody>
+          <a:bodyPr wrap="square" rtlCol="0">
+            <a:spAutoFit/>
+          </a:bodyPr>
+          <a:lstStyle/>
+          <a:p>
+            <a:r>
+              <a:rPr lang="en-US" dirty="0"/>
+              <a:t>{call}</a:t>
+            </a:r>
+          </a:p>
+        </p:txBody>
+      </p:sp>
+      <p:cxnSp>
+        <p:nvCxnSpPr>
+          <p:cNvPr id="39" name="Straight Connector 38">
+            <a:extLst>
+              <a:ext uri="{FF2B5EF4-FFF2-40B4-BE49-F238E27FC236}">
+                <a16:creationId xmlns:a16="http://schemas.microsoft.com/office/drawing/2014/main" id="{D542816D-D1AD-4D8B-A329-67476A918A10}"/>
+              </a:ext>
+            </a:extLst>
+          </p:cNvPr>
+          <p:cNvCxnSpPr>
+            <a:cxnSpLocks/>
+          </p:cNvCxnSpPr>
+          <p:nvPr/>
+        </p:nvCxnSpPr>
+        <p:spPr>
+          <a:xfrm flipH="1" flipV="1">
+            <a:off x="4720386" y="4302920"/>
+            <a:ext cx="1413644" cy="778670"/>
+          </a:xfrm>
+          <a:prstGeom prst="line">
+            <a:avLst/>
+          </a:prstGeom>
+          <a:ln w="12700">
+            <a:solidFill>
+              <a:schemeClr val="bg1">
+                <a:lumMod val="50000"/>
+              </a:schemeClr>
+            </a:solidFill>
+            <a:prstDash val="dash"/>
+            <a:headEnd type="arrow"/>
+          </a:ln>
+        </p:spPr>
+        <p:style>
+          <a:lnRef idx="1">
+            <a:schemeClr val="accent1"/>
+          </a:lnRef>
+          <a:fillRef idx="0">
+            <a:schemeClr val="accent1"/>
+          </a:fillRef>
+          <a:effectRef idx="0">
+            <a:schemeClr val="accent1"/>
+          </a:effectRef>
+          <a:fontRef idx="minor">
+            <a:schemeClr val="tx1"/>
+          </a:fontRef>
+        </p:style>
+      </p:cxnSp>
+      <p:sp>
+        <p:nvSpPr>
+          <p:cNvPr id="40" name="Arc 39">
+            <a:extLst>
+              <a:ext uri="{FF2B5EF4-FFF2-40B4-BE49-F238E27FC236}">
+                <a16:creationId xmlns:a16="http://schemas.microsoft.com/office/drawing/2014/main" id="{6056021F-53FA-49BA-A6B1-2437EB80C948}"/>
+              </a:ext>
+            </a:extLst>
+          </p:cNvPr>
+          <p:cNvSpPr/>
+          <p:nvPr/>
+        </p:nvSpPr>
+        <p:spPr>
+          <a:xfrm rot="10800000">
+            <a:off x="4445472" y="4108773"/>
+            <a:ext cx="345042" cy="354369"/>
+          </a:xfrm>
+          <a:prstGeom prst="arc">
+            <a:avLst>
+              <a:gd name="adj1" fmla="val 16200000"/>
+              <a:gd name="adj2" fmla="val 5657069"/>
+            </a:avLst>
+          </a:prstGeom>
+          <a:ln w="12700">
+            <a:solidFill>
+              <a:schemeClr val="tx1"/>
+            </a:solidFill>
+          </a:ln>
+        </p:spPr>
+        <p:style>
+          <a:lnRef idx="1">
+            <a:schemeClr val="accent1"/>
+          </a:lnRef>
+          <a:fillRef idx="0">
+            <a:schemeClr val="accent1"/>
+          </a:fillRef>
+          <a:effectRef idx="0">
+            <a:schemeClr val="accent1"/>
+          </a:effectRef>
+          <a:fontRef idx="minor">
+            <a:schemeClr val="tx1"/>
+          </a:fontRef>
+        </p:style>
+        <p:txBody>
+          <a:bodyPr rtlCol="0" anchor="ctr"/>
+          <a:lstStyle/>
+          <a:p>
+            <a:pPr algn="ctr"/>
+            <a:endParaRPr lang="en-US"/>
+          </a:p>
+        </p:txBody>
+      </p:sp>
+      <p:sp>
+        <p:nvSpPr>
+          <p:cNvPr id="41" name="Rectangle: Rounded Corners 40">
+            <a:extLst>
+              <a:ext uri="{FF2B5EF4-FFF2-40B4-BE49-F238E27FC236}">
+                <a16:creationId xmlns:a16="http://schemas.microsoft.com/office/drawing/2014/main" id="{A9C5A301-DF0E-499B-8F9D-F0EB61F38218}"/>
+              </a:ext>
+            </a:extLst>
+          </p:cNvPr>
+          <p:cNvSpPr/>
+          <p:nvPr/>
+        </p:nvSpPr>
+        <p:spPr>
+          <a:xfrm>
+            <a:off x="3532344" y="4162420"/>
+            <a:ext cx="590603" cy="232779"/>
+          </a:xfrm>
+          <a:prstGeom prst="roundRect">
+            <a:avLst/>
+          </a:prstGeom>
+          <a:solidFill>
+            <a:schemeClr val="bg1">
+              <a:lumMod val="65000"/>
+            </a:schemeClr>
+          </a:solidFill>
+        </p:spPr>
+        <p:style>
+          <a:lnRef idx="2">
+            <a:schemeClr val="accent1">
+              <a:shade val="50000"/>
+            </a:schemeClr>
+          </a:lnRef>
+          <a:fillRef idx="1">
+            <a:schemeClr val="accent1"/>
+          </a:fillRef>
+          <a:effectRef idx="0">
+            <a:schemeClr val="accent1"/>
+          </a:effectRef>
+          <a:fontRef idx="minor">
+            <a:schemeClr val="lt1"/>
+          </a:fontRef>
+        </p:style>
+        <p:txBody>
+          <a:bodyPr rtlCol="0" anchor="ctr">
+            <a:normAutofit fontScale="47500" lnSpcReduction="20000"/>
+          </a:bodyPr>
+          <a:lstStyle/>
+          <a:p>
+            <a:pPr algn="ctr"/>
+            <a:r>
+              <a:rPr lang="en-US" dirty="0"/>
+              <a:t>stub</a:t>
+            </a:r>
+          </a:p>
+        </p:txBody>
+      </p:sp>
+      <p:cxnSp>
+        <p:nvCxnSpPr>
+          <p:cNvPr id="42" name="Straight Connector 41">
+            <a:extLst>
+              <a:ext uri="{FF2B5EF4-FFF2-40B4-BE49-F238E27FC236}">
+                <a16:creationId xmlns:a16="http://schemas.microsoft.com/office/drawing/2014/main" id="{00EF4B00-8260-4A01-8146-4A33D038277F}"/>
+              </a:ext>
+            </a:extLst>
+          </p:cNvPr>
+          <p:cNvCxnSpPr>
+            <a:cxnSpLocks/>
+          </p:cNvCxnSpPr>
+          <p:nvPr/>
+        </p:nvCxnSpPr>
+        <p:spPr>
+          <a:xfrm flipH="1">
+            <a:off x="4122947" y="4278320"/>
+            <a:ext cx="320019" cy="6156"/>
+          </a:xfrm>
+          <a:prstGeom prst="line">
+            <a:avLst/>
+          </a:prstGeom>
+          <a:ln w="12700">
+            <a:solidFill>
+              <a:schemeClr val="tx1"/>
+            </a:solidFill>
+          </a:ln>
+        </p:spPr>
+        <p:style>
+          <a:lnRef idx="1">
+            <a:schemeClr val="accent1"/>
+          </a:lnRef>
+          <a:fillRef idx="0">
+            <a:schemeClr val="accent1"/>
+          </a:fillRef>
+          <a:effectRef idx="0">
+            <a:schemeClr val="accent1"/>
+          </a:effectRef>
+          <a:fontRef idx="minor">
+            <a:schemeClr val="tx1"/>
+          </a:fontRef>
+        </p:style>
+      </p:cxnSp>
+      <p:cxnSp>
+        <p:nvCxnSpPr>
+          <p:cNvPr id="47" name="Straight Connector 46">
+            <a:extLst>
+              <a:ext uri="{FF2B5EF4-FFF2-40B4-BE49-F238E27FC236}">
+                <a16:creationId xmlns:a16="http://schemas.microsoft.com/office/drawing/2014/main" id="{234E1C3E-586F-4B76-B7FF-346FB871D5AC}"/>
+              </a:ext>
+            </a:extLst>
+          </p:cNvPr>
+          <p:cNvCxnSpPr>
+            <a:cxnSpLocks/>
+          </p:cNvCxnSpPr>
+          <p:nvPr/>
+        </p:nvCxnSpPr>
+        <p:spPr>
+          <a:xfrm flipH="1" flipV="1">
+            <a:off x="4726820" y="3763624"/>
+            <a:ext cx="1407210" cy="4540"/>
+          </a:xfrm>
+          <a:prstGeom prst="line">
+            <a:avLst/>
+          </a:prstGeom>
+          <a:ln w="12700">
+            <a:solidFill>
+              <a:schemeClr val="bg1">
+                <a:lumMod val="50000"/>
+              </a:schemeClr>
+            </a:solidFill>
+            <a:prstDash val="dash"/>
+            <a:headEnd type="arrow"/>
+          </a:ln>
+        </p:spPr>
+        <p:style>
+          <a:lnRef idx="1">
+            <a:schemeClr val="accent1"/>
+          </a:lnRef>
+          <a:fillRef idx="0">
+            <a:schemeClr val="accent1"/>
+          </a:fillRef>
+          <a:effectRef idx="0">
+            <a:schemeClr val="accent1"/>
+          </a:effectRef>
+          <a:fontRef idx="minor">
+            <a:schemeClr val="tx1"/>
+          </a:fontRef>
+        </p:style>
+      </p:cxnSp>
+      <p:sp>
+        <p:nvSpPr>
+          <p:cNvPr id="48" name="Arc 47">
+            <a:extLst>
+              <a:ext uri="{FF2B5EF4-FFF2-40B4-BE49-F238E27FC236}">
+                <a16:creationId xmlns:a16="http://schemas.microsoft.com/office/drawing/2014/main" id="{CF5FDB88-5BD1-4C1B-8F0D-4B12873BB96F}"/>
+              </a:ext>
+            </a:extLst>
+          </p:cNvPr>
+          <p:cNvSpPr/>
+          <p:nvPr/>
+        </p:nvSpPr>
+        <p:spPr>
+          <a:xfrm rot="10800000">
+            <a:off x="4441849" y="3598617"/>
+            <a:ext cx="345042" cy="354369"/>
+          </a:xfrm>
+          <a:prstGeom prst="arc">
+            <a:avLst>
+              <a:gd name="adj1" fmla="val 16200000"/>
+              <a:gd name="adj2" fmla="val 5657069"/>
+            </a:avLst>
+          </a:prstGeom>
+          <a:ln w="12700">
+            <a:solidFill>
+              <a:schemeClr val="tx1"/>
+            </a:solidFill>
+          </a:ln>
+        </p:spPr>
+        <p:style>
+          <a:lnRef idx="1">
+            <a:schemeClr val="accent1"/>
+          </a:lnRef>
+          <a:fillRef idx="0">
+            <a:schemeClr val="accent1"/>
+          </a:fillRef>
+          <a:effectRef idx="0">
+            <a:schemeClr val="accent1"/>
+          </a:effectRef>
+          <a:fontRef idx="minor">
+            <a:schemeClr val="tx1"/>
+          </a:fontRef>
+        </p:style>
+        <p:txBody>
+          <a:bodyPr rtlCol="0" anchor="ctr"/>
+          <a:lstStyle/>
+          <a:p>
+            <a:pPr algn="ctr"/>
+            <a:endParaRPr lang="en-US"/>
+          </a:p>
+        </p:txBody>
+      </p:sp>
+      <p:sp>
+        <p:nvSpPr>
+          <p:cNvPr id="49" name="Rectangle: Rounded Corners 48">
+            <a:extLst>
+              <a:ext uri="{FF2B5EF4-FFF2-40B4-BE49-F238E27FC236}">
+                <a16:creationId xmlns:a16="http://schemas.microsoft.com/office/drawing/2014/main" id="{8E0D621B-0E31-48C4-83D0-FF0839C45C83}"/>
+              </a:ext>
+            </a:extLst>
+          </p:cNvPr>
+          <p:cNvSpPr/>
+          <p:nvPr/>
+        </p:nvSpPr>
+        <p:spPr>
+          <a:xfrm>
+            <a:off x="3528721" y="3652264"/>
+            <a:ext cx="590603" cy="232779"/>
+          </a:xfrm>
+          <a:prstGeom prst="roundRect">
+            <a:avLst/>
+          </a:prstGeom>
+          <a:solidFill>
+            <a:schemeClr val="bg1">
+              <a:lumMod val="65000"/>
+            </a:schemeClr>
+          </a:solidFill>
+        </p:spPr>
+        <p:style>
+          <a:lnRef idx="2">
+            <a:schemeClr val="accent1">
+              <a:shade val="50000"/>
+            </a:schemeClr>
+          </a:lnRef>
+          <a:fillRef idx="1">
+            <a:schemeClr val="accent1"/>
+          </a:fillRef>
+          <a:effectRef idx="0">
+            <a:schemeClr val="accent1"/>
+          </a:effectRef>
+          <a:fontRef idx="minor">
+            <a:schemeClr val="lt1"/>
+          </a:fontRef>
+        </p:style>
+        <p:txBody>
+          <a:bodyPr rtlCol="0" anchor="ctr">
+            <a:normAutofit fontScale="47500" lnSpcReduction="20000"/>
+          </a:bodyPr>
+          <a:lstStyle/>
+          <a:p>
+            <a:pPr algn="ctr"/>
+            <a:r>
+              <a:rPr lang="en-US" dirty="0"/>
+              <a:t>stub</a:t>
+            </a:r>
+          </a:p>
+        </p:txBody>
+      </p:sp>
+      <p:cxnSp>
+        <p:nvCxnSpPr>
+          <p:cNvPr id="50" name="Straight Connector 49">
+            <a:extLst>
+              <a:ext uri="{FF2B5EF4-FFF2-40B4-BE49-F238E27FC236}">
+                <a16:creationId xmlns:a16="http://schemas.microsoft.com/office/drawing/2014/main" id="{67920D2F-FF82-4B1E-84DF-BF437981153A}"/>
+              </a:ext>
+            </a:extLst>
+          </p:cNvPr>
+          <p:cNvCxnSpPr>
+            <a:cxnSpLocks/>
+          </p:cNvCxnSpPr>
+          <p:nvPr/>
+        </p:nvCxnSpPr>
+        <p:spPr>
+          <a:xfrm flipH="1">
+            <a:off x="4119324" y="3768164"/>
+            <a:ext cx="320019" cy="6156"/>
+          </a:xfrm>
+          <a:prstGeom prst="line">
+            <a:avLst/>
+          </a:prstGeom>
+          <a:ln w="12700">
+            <a:solidFill>
+              <a:schemeClr val="tx1"/>
+            </a:solidFill>
+          </a:ln>
+        </p:spPr>
+        <p:style>
+          <a:lnRef idx="1">
+            <a:schemeClr val="accent1"/>
+          </a:lnRef>
+          <a:fillRef idx="0">
+            <a:schemeClr val="accent1"/>
+          </a:fillRef>
+          <a:effectRef idx="0">
+            <a:schemeClr val="accent1"/>
+          </a:effectRef>
+          <a:fontRef idx="minor">
+            <a:schemeClr val="tx1"/>
+          </a:fontRef>
+        </p:style>
+      </p:cxnSp>
+      <p:sp>
+        <p:nvSpPr>
+          <p:cNvPr id="54" name="Rectangle 53">
+            <a:extLst>
+              <a:ext uri="{FF2B5EF4-FFF2-40B4-BE49-F238E27FC236}">
+                <a16:creationId xmlns:a16="http://schemas.microsoft.com/office/drawing/2014/main" id="{1B196353-3FC0-4891-A61A-714B45753189}"/>
+              </a:ext>
+            </a:extLst>
+          </p:cNvPr>
+          <p:cNvSpPr/>
+          <p:nvPr/>
+        </p:nvSpPr>
+        <p:spPr>
+          <a:xfrm>
+            <a:off x="1577761" y="3504180"/>
+            <a:ext cx="492528" cy="463234"/>
+          </a:xfrm>
+          <a:prstGeom prst="rect">
+            <a:avLst/>
+          </a:prstGeom>
+          <a:solidFill>
+            <a:srgbClr val="FFFF00"/>
+          </a:solidFill>
+        </p:spPr>
+        <p:style>
+          <a:lnRef idx="2">
+            <a:schemeClr val="accent1">
+              <a:shade val="50000"/>
+            </a:schemeClr>
+          </a:lnRef>
+          <a:fillRef idx="1">
+            <a:schemeClr val="accent1"/>
+          </a:fillRef>
+          <a:effectRef idx="0">
+            <a:schemeClr val="accent1"/>
+          </a:effectRef>
+          <a:fontRef idx="minor">
+            <a:schemeClr val="lt1"/>
+          </a:fontRef>
+        </p:style>
+        <p:txBody>
+          <a:bodyPr rtlCol="0" anchor="ctr"/>
+          <a:lstStyle/>
+          <a:p>
+            <a:pPr algn="ctr"/>
+            <a:r>
+              <a:rPr lang="en-US" dirty="0">
+                <a:solidFill>
+                  <a:schemeClr val="tx1"/>
+                </a:solidFill>
+              </a:rPr>
+              <a:t>I/F</a:t>
+            </a:r>
+          </a:p>
+        </p:txBody>
+      </p:sp>
+      <p:sp>
+        <p:nvSpPr>
+          <p:cNvPr id="55" name="TextBox 54">
+            <a:extLst>
+              <a:ext uri="{FF2B5EF4-FFF2-40B4-BE49-F238E27FC236}">
+                <a16:creationId xmlns:a16="http://schemas.microsoft.com/office/drawing/2014/main" id="{C630EDB7-3D98-485F-A673-7B18A101D6B8}"/>
+              </a:ext>
+            </a:extLst>
+          </p:cNvPr>
+          <p:cNvSpPr txBox="1"/>
+          <p:nvPr/>
+        </p:nvSpPr>
+        <p:spPr>
+          <a:xfrm>
+            <a:off x="853965" y="3553075"/>
+            <a:ext cx="682975" cy="369332"/>
+          </a:xfrm>
+          <a:prstGeom prst="rect">
+            <a:avLst/>
+          </a:prstGeom>
+          <a:solidFill>
+            <a:srgbClr val="FFFF00"/>
+          </a:solidFill>
+          <a:ln>
+            <a:solidFill>
+              <a:schemeClr val="tx1"/>
+            </a:solidFill>
+          </a:ln>
+        </p:spPr>
+        <p:txBody>
+          <a:bodyPr wrap="square" rtlCol="0">
+            <a:spAutoFit/>
+          </a:bodyPr>
+          <a:lstStyle/>
+          <a:p>
+            <a:r>
+              <a:rPr lang="en-US" dirty="0"/>
+              <a:t>{call}</a:t>
+            </a:r>
+          </a:p>
+        </p:txBody>
+      </p:sp>
     </p:spTree>
     <p:extLst>
       <p:ext uri="{BB962C8B-B14F-4D97-AF65-F5344CB8AC3E}">
-        <p14:creationId xmlns:p14="http://schemas.microsoft.com/office/powerpoint/2010/main" val="3174622084"/>
+        <p14:creationId xmlns:p14="http://schemas.microsoft.com/office/powerpoint/2010/main" val="3948470202"/>
       </p:ext>
     </p:extLst>
   </p:cSld>

</xml_diff>

<commit_message>
docs - RpcInterface architecture diagrams show that client can use a different configs for different serves
</commit_message>
<xml_diff>
--- a/docs/overview/SoftwareArchitecture.pptx
+++ b/docs/overview/SoftwareArchitecture.pptx
@@ -8065,13 +8065,13 @@
           <a:prstGeom prst="line">
             <a:avLst/>
           </a:prstGeom>
-          <a:ln w="12700">
+          <a:ln w="19050">
             <a:solidFill>
               <a:schemeClr val="bg1">
                 <a:lumMod val="50000"/>
               </a:schemeClr>
             </a:solidFill>
-            <a:prstDash val="dash"/>
+            <a:prstDash val="lgDashDot"/>
             <a:headEnd type="arrow"/>
           </a:ln>
         </p:spPr>
@@ -11569,13 +11569,13 @@
           <a:prstGeom prst="line">
             <a:avLst/>
           </a:prstGeom>
-          <a:ln w="12700">
+          <a:ln w="19050">
             <a:solidFill>
               <a:schemeClr val="bg1">
                 <a:lumMod val="50000"/>
               </a:schemeClr>
             </a:solidFill>
-            <a:prstDash val="dash"/>
+            <a:prstDash val="dashDot"/>
             <a:headEnd type="arrow"/>
           </a:ln>
         </p:spPr>
@@ -33228,13 +33228,13 @@
           <a:prstGeom prst="line">
             <a:avLst/>
           </a:prstGeom>
-          <a:ln w="12700">
+          <a:ln w="19050">
             <a:solidFill>
               <a:schemeClr val="bg1">
                 <a:lumMod val="50000"/>
               </a:schemeClr>
             </a:solidFill>
-            <a:prstDash val="dash"/>
+            <a:prstDash val="lgDashDot"/>
             <a:headEnd type="arrow"/>
           </a:ln>
         </p:spPr>

</xml_diff>